<commit_message>
alterei powerpoint e mudei nome dos arquivos de arquitetura
</commit_message>
<xml_diff>
--- a/documentacao/PowerPoint.pptx
+++ b/documentacao/PowerPoint.pptx
@@ -140,10 +140,10 @@
   <c:roundedCorners val="0"/>
   <mc:AlternateContent xmlns:mc="http://schemas.openxmlformats.org/markup-compatibility/2006">
     <mc:Choice xmlns:c14="http://schemas.microsoft.com/office/drawing/2007/8/2/chart" Requires="c14">
-      <c14:style val="107"/>
+      <c14:style val="102"/>
     </mc:Choice>
     <mc:Fallback>
-      <c:style val="7"/>
+      <c:style val="2"/>
     </mc:Fallback>
   </mc:AlternateContent>
   <c:chart>
@@ -171,9 +171,7 @@
             <c:bubble3D val="0"/>
             <c:spPr>
               <a:solidFill>
-                <a:schemeClr val="accent5">
-                  <a:tint val="58000"/>
-                </a:schemeClr>
+                <a:schemeClr val="accent1"/>
               </a:solidFill>
               <a:ln>
                 <a:noFill/>
@@ -186,15 +184,18 @@
                 </a:outerShdw>
               </a:effectLst>
             </c:spPr>
+            <c:extLst>
+              <c:ext xmlns:c16="http://schemas.microsoft.com/office/drawing/2014/chart" uri="{C3380CC4-5D6E-409C-BE32-E72D297353CC}">
+                <c16:uniqueId val="{00000001-749E-4529-A1A6-5419C5DD7C65}"/>
+              </c:ext>
+            </c:extLst>
           </c:dPt>
           <c:dPt>
             <c:idx val="1"/>
             <c:bubble3D val="0"/>
             <c:spPr>
               <a:solidFill>
-                <a:schemeClr val="accent5">
-                  <a:tint val="86000"/>
-                </a:schemeClr>
+                <a:schemeClr val="accent2"/>
               </a:solidFill>
               <a:ln>
                 <a:noFill/>
@@ -207,15 +208,18 @@
                 </a:outerShdw>
               </a:effectLst>
             </c:spPr>
+            <c:extLst>
+              <c:ext xmlns:c16="http://schemas.microsoft.com/office/drawing/2014/chart" uri="{C3380CC4-5D6E-409C-BE32-E72D297353CC}">
+                <c16:uniqueId val="{00000003-749E-4529-A1A6-5419C5DD7C65}"/>
+              </c:ext>
+            </c:extLst>
           </c:dPt>
           <c:dPt>
             <c:idx val="2"/>
             <c:bubble3D val="0"/>
             <c:spPr>
               <a:solidFill>
-                <a:schemeClr val="accent5">
-                  <a:shade val="86000"/>
-                </a:schemeClr>
+                <a:schemeClr val="accent3"/>
               </a:solidFill>
               <a:ln>
                 <a:noFill/>
@@ -228,15 +232,18 @@
                 </a:outerShdw>
               </a:effectLst>
             </c:spPr>
+            <c:extLst>
+              <c:ext xmlns:c16="http://schemas.microsoft.com/office/drawing/2014/chart" uri="{C3380CC4-5D6E-409C-BE32-E72D297353CC}">
+                <c16:uniqueId val="{00000005-749E-4529-A1A6-5419C5DD7C65}"/>
+              </c:ext>
+            </c:extLst>
           </c:dPt>
           <c:dPt>
             <c:idx val="3"/>
             <c:bubble3D val="0"/>
             <c:spPr>
               <a:solidFill>
-                <a:schemeClr val="accent5">
-                  <a:shade val="58000"/>
-                </a:schemeClr>
+                <a:schemeClr val="accent4"/>
               </a:solidFill>
               <a:ln>
                 <a:noFill/>
@@ -249,6 +256,11 @@
                 </a:outerShdw>
               </a:effectLst>
             </c:spPr>
+            <c:extLst>
+              <c:ext xmlns:c16="http://schemas.microsoft.com/office/drawing/2014/chart" uri="{C3380CC4-5D6E-409C-BE32-E72D297353CC}">
+                <c16:uniqueId val="{00000007-749E-4529-A1A6-5419C5DD7C65}"/>
+              </c:ext>
+            </c:extLst>
           </c:dPt>
           <c:dLbls>
             <c:spPr>
@@ -369,9 +381,7 @@
             <c:bubble3D val="0"/>
             <c:spPr>
               <a:solidFill>
-                <a:schemeClr val="accent5">
-                  <a:tint val="58000"/>
-                </a:schemeClr>
+                <a:schemeClr val="accent1"/>
               </a:solidFill>
               <a:ln>
                 <a:noFill/>
@@ -384,15 +394,18 @@
                 </a:outerShdw>
               </a:effectLst>
             </c:spPr>
+            <c:extLst>
+              <c:ext xmlns:c16="http://schemas.microsoft.com/office/drawing/2014/chart" uri="{C3380CC4-5D6E-409C-BE32-E72D297353CC}">
+                <c16:uniqueId val="{00000009-749E-4529-A1A6-5419C5DD7C65}"/>
+              </c:ext>
+            </c:extLst>
           </c:dPt>
           <c:dPt>
             <c:idx val="1"/>
             <c:bubble3D val="0"/>
             <c:spPr>
               <a:solidFill>
-                <a:schemeClr val="accent5">
-                  <a:tint val="86000"/>
-                </a:schemeClr>
+                <a:schemeClr val="accent2"/>
               </a:solidFill>
               <a:ln>
                 <a:noFill/>
@@ -405,15 +418,18 @@
                 </a:outerShdw>
               </a:effectLst>
             </c:spPr>
+            <c:extLst>
+              <c:ext xmlns:c16="http://schemas.microsoft.com/office/drawing/2014/chart" uri="{C3380CC4-5D6E-409C-BE32-E72D297353CC}">
+                <c16:uniqueId val="{0000000B-749E-4529-A1A6-5419C5DD7C65}"/>
+              </c:ext>
+            </c:extLst>
           </c:dPt>
           <c:dPt>
             <c:idx val="2"/>
             <c:bubble3D val="0"/>
             <c:spPr>
               <a:solidFill>
-                <a:schemeClr val="accent5">
-                  <a:shade val="86000"/>
-                </a:schemeClr>
+                <a:schemeClr val="accent3"/>
               </a:solidFill>
               <a:ln>
                 <a:noFill/>
@@ -426,15 +442,18 @@
                 </a:outerShdw>
               </a:effectLst>
             </c:spPr>
+            <c:extLst>
+              <c:ext xmlns:c16="http://schemas.microsoft.com/office/drawing/2014/chart" uri="{C3380CC4-5D6E-409C-BE32-E72D297353CC}">
+                <c16:uniqueId val="{0000000D-749E-4529-A1A6-5419C5DD7C65}"/>
+              </c:ext>
+            </c:extLst>
           </c:dPt>
           <c:dPt>
             <c:idx val="3"/>
             <c:bubble3D val="0"/>
             <c:spPr>
               <a:solidFill>
-                <a:schemeClr val="accent5">
-                  <a:shade val="58000"/>
-                </a:schemeClr>
+                <a:schemeClr val="accent4"/>
               </a:solidFill>
               <a:ln>
                 <a:noFill/>
@@ -447,6 +466,11 @@
                 </a:outerShdw>
               </a:effectLst>
             </c:spPr>
+            <c:extLst>
+              <c:ext xmlns:c16="http://schemas.microsoft.com/office/drawing/2014/chart" uri="{C3380CC4-5D6E-409C-BE32-E72D297353CC}">
+                <c16:uniqueId val="{0000000F-749E-4529-A1A6-5419C5DD7C65}"/>
+              </c:ext>
+            </c:extLst>
           </c:dPt>
           <c:dLbls>
             <c:spPr>
@@ -567,9 +591,7 @@
             <c:bubble3D val="0"/>
             <c:spPr>
               <a:solidFill>
-                <a:schemeClr val="accent5">
-                  <a:tint val="58000"/>
-                </a:schemeClr>
+                <a:schemeClr val="accent1"/>
               </a:solidFill>
               <a:ln>
                 <a:noFill/>
@@ -582,15 +604,18 @@
                 </a:outerShdw>
               </a:effectLst>
             </c:spPr>
+            <c:extLst>
+              <c:ext xmlns:c16="http://schemas.microsoft.com/office/drawing/2014/chart" uri="{C3380CC4-5D6E-409C-BE32-E72D297353CC}">
+                <c16:uniqueId val="{00000011-749E-4529-A1A6-5419C5DD7C65}"/>
+              </c:ext>
+            </c:extLst>
           </c:dPt>
           <c:dPt>
             <c:idx val="1"/>
             <c:bubble3D val="0"/>
             <c:spPr>
               <a:solidFill>
-                <a:schemeClr val="accent5">
-                  <a:tint val="86000"/>
-                </a:schemeClr>
+                <a:schemeClr val="accent2"/>
               </a:solidFill>
               <a:ln>
                 <a:noFill/>
@@ -603,15 +628,18 @@
                 </a:outerShdw>
               </a:effectLst>
             </c:spPr>
+            <c:extLst>
+              <c:ext xmlns:c16="http://schemas.microsoft.com/office/drawing/2014/chart" uri="{C3380CC4-5D6E-409C-BE32-E72D297353CC}">
+                <c16:uniqueId val="{00000013-749E-4529-A1A6-5419C5DD7C65}"/>
+              </c:ext>
+            </c:extLst>
           </c:dPt>
           <c:dPt>
             <c:idx val="2"/>
             <c:bubble3D val="0"/>
             <c:spPr>
               <a:solidFill>
-                <a:schemeClr val="accent5">
-                  <a:shade val="86000"/>
-                </a:schemeClr>
+                <a:schemeClr val="accent3"/>
               </a:solidFill>
               <a:ln>
                 <a:noFill/>
@@ -624,15 +652,18 @@
                 </a:outerShdw>
               </a:effectLst>
             </c:spPr>
+            <c:extLst>
+              <c:ext xmlns:c16="http://schemas.microsoft.com/office/drawing/2014/chart" uri="{C3380CC4-5D6E-409C-BE32-E72D297353CC}">
+                <c16:uniqueId val="{00000015-749E-4529-A1A6-5419C5DD7C65}"/>
+              </c:ext>
+            </c:extLst>
           </c:dPt>
           <c:dPt>
             <c:idx val="3"/>
             <c:bubble3D val="0"/>
             <c:spPr>
               <a:solidFill>
-                <a:schemeClr val="accent5">
-                  <a:shade val="58000"/>
-                </a:schemeClr>
+                <a:schemeClr val="accent4"/>
               </a:solidFill>
               <a:ln>
                 <a:noFill/>
@@ -645,6 +676,11 @@
                 </a:outerShdw>
               </a:effectLst>
             </c:spPr>
+            <c:extLst>
+              <c:ext xmlns:c16="http://schemas.microsoft.com/office/drawing/2014/chart" uri="{C3380CC4-5D6E-409C-BE32-E72D297353CC}">
+                <c16:uniqueId val="{00000017-749E-4529-A1A6-5419C5DD7C65}"/>
+              </c:ext>
+            </c:extLst>
           </c:dPt>
           <c:dLbls>
             <c:spPr>
@@ -844,8 +880,42 @@
 </file>
 
 <file path=ppt/charts/colors1.xml><?xml version="1.0" encoding="utf-8"?>
-<cs:colorStyle xmlns:cs="http://schemas.microsoft.com/office/drawing/2012/chartStyle" xmlns:a="http://schemas.openxmlformats.org/drawingml/2006/main" meth="withinLinearReversed" id="25">
+<cs:colorStyle xmlns:cs="http://schemas.microsoft.com/office/drawing/2012/chartStyle" xmlns:a="http://schemas.openxmlformats.org/drawingml/2006/main" meth="cycle" id="10">
+  <a:schemeClr val="accent1"/>
+  <a:schemeClr val="accent2"/>
+  <a:schemeClr val="accent3"/>
+  <a:schemeClr val="accent4"/>
   <a:schemeClr val="accent5"/>
+  <a:schemeClr val="accent6"/>
+  <cs:variation/>
+  <cs:variation>
+    <a:lumMod val="60000"/>
+  </cs:variation>
+  <cs:variation>
+    <a:lumMod val="80000"/>
+    <a:lumOff val="20000"/>
+  </cs:variation>
+  <cs:variation>
+    <a:lumMod val="80000"/>
+  </cs:variation>
+  <cs:variation>
+    <a:lumMod val="60000"/>
+    <a:lumOff val="40000"/>
+  </cs:variation>
+  <cs:variation>
+    <a:lumMod val="50000"/>
+  </cs:variation>
+  <cs:variation>
+    <a:lumMod val="70000"/>
+    <a:lumOff val="30000"/>
+  </cs:variation>
+  <cs:variation>
+    <a:lumMod val="70000"/>
+  </cs:variation>
+  <cs:variation>
+    <a:lumMod val="50000"/>
+    <a:lumOff val="50000"/>
+  </cs:variation>
 </cs:colorStyle>
 </file>
 
@@ -2520,12 +2590,12 @@
         </a:fontRef>
       </dsp:style>
       <dsp:txBody>
-        <a:bodyPr spcFirstLastPara="0" vert="horz" wrap="square" lIns="108014" tIns="36005" rIns="36005" bIns="36005" numCol="1" spcCol="1270" rtlCol="0" anchor="ctr" anchorCtr="0">
+        <a:bodyPr spcFirstLastPara="0" vert="horz" wrap="square" lIns="120015" tIns="40005" rIns="40005" bIns="40005" numCol="1" spcCol="1270" rtlCol="0" anchor="ctr" anchorCtr="0">
           <a:noAutofit/>
         </a:bodyPr>
         <a:lstStyle/>
         <a:p>
-          <a:pPr marL="0" lvl="0" indent="0" algn="ctr" defTabSz="1200150" rtl="0">
+          <a:pPr marL="0" lvl="0" indent="0" algn="ctr" defTabSz="1333500" rtl="0">
             <a:lnSpc>
               <a:spcPct val="90000"/>
             </a:lnSpc>
@@ -2538,7 +2608,7 @@
             <a:buNone/>
           </a:pPr>
           <a:r>
-            <a:rPr lang="pt-BR" sz="2700" kern="1200" noProof="0" dirty="0"/>
+            <a:rPr lang="pt-BR" sz="3000" kern="1200" noProof="0" dirty="0"/>
             <a:t>Título da etapa 1</a:t>
           </a:r>
         </a:p>
@@ -2599,12 +2669,12 @@
         </a:fontRef>
       </dsp:style>
       <dsp:txBody>
-        <a:bodyPr spcFirstLastPara="0" vert="horz" wrap="square" lIns="108014" tIns="36005" rIns="36005" bIns="36005" numCol="1" spcCol="1270" rtlCol="0" anchor="ctr" anchorCtr="0">
+        <a:bodyPr spcFirstLastPara="0" vert="horz" wrap="square" lIns="120015" tIns="40005" rIns="40005" bIns="40005" numCol="1" spcCol="1270" rtlCol="0" anchor="ctr" anchorCtr="0">
           <a:noAutofit/>
         </a:bodyPr>
         <a:lstStyle/>
         <a:p>
-          <a:pPr marL="0" lvl="0" indent="0" algn="ctr" defTabSz="1200150" rtl="0">
+          <a:pPr marL="0" lvl="0" indent="0" algn="ctr" defTabSz="1333500" rtl="0">
             <a:lnSpc>
               <a:spcPct val="90000"/>
             </a:lnSpc>
@@ -2617,7 +2687,7 @@
             <a:buNone/>
           </a:pPr>
           <a:r>
-            <a:rPr lang="pt-BR" sz="2700" kern="1200" noProof="0" dirty="0"/>
+            <a:rPr lang="pt-BR" sz="3000" kern="1200" noProof="0" dirty="0"/>
             <a:t>Título da etapa 2</a:t>
           </a:r>
         </a:p>
@@ -2678,12 +2748,12 @@
         </a:fontRef>
       </dsp:style>
       <dsp:txBody>
-        <a:bodyPr spcFirstLastPara="0" vert="horz" wrap="square" lIns="108014" tIns="36005" rIns="36005" bIns="36005" numCol="1" spcCol="1270" rtlCol="0" anchor="ctr" anchorCtr="0">
+        <a:bodyPr spcFirstLastPara="0" vert="horz" wrap="square" lIns="120015" tIns="40005" rIns="40005" bIns="40005" numCol="1" spcCol="1270" rtlCol="0" anchor="ctr" anchorCtr="0">
           <a:noAutofit/>
         </a:bodyPr>
         <a:lstStyle/>
         <a:p>
-          <a:pPr marL="0" lvl="0" indent="0" algn="ctr" defTabSz="1200150" rtl="0">
+          <a:pPr marL="0" lvl="0" indent="0" algn="ctr" defTabSz="1333500" rtl="0">
             <a:lnSpc>
               <a:spcPct val="90000"/>
             </a:lnSpc>
@@ -2696,7 +2766,7 @@
             <a:buNone/>
           </a:pPr>
           <a:r>
-            <a:rPr lang="pt-BR" sz="2700" kern="1200" noProof="0" dirty="0"/>
+            <a:rPr lang="pt-BR" sz="3000" kern="1200" noProof="0" dirty="0"/>
             <a:t>Título da etapa 3</a:t>
           </a:r>
         </a:p>
@@ -2757,12 +2827,12 @@
         </a:fontRef>
       </dsp:style>
       <dsp:txBody>
-        <a:bodyPr spcFirstLastPara="0" vert="horz" wrap="square" lIns="108014" tIns="36005" rIns="36005" bIns="36005" numCol="1" spcCol="1270" rtlCol="0" anchor="ctr" anchorCtr="0">
+        <a:bodyPr spcFirstLastPara="0" vert="horz" wrap="square" lIns="120015" tIns="40005" rIns="40005" bIns="40005" numCol="1" spcCol="1270" rtlCol="0" anchor="ctr" anchorCtr="0">
           <a:noAutofit/>
         </a:bodyPr>
         <a:lstStyle/>
         <a:p>
-          <a:pPr marL="0" lvl="0" indent="0" algn="ctr" defTabSz="1200150" rtl="0">
+          <a:pPr marL="0" lvl="0" indent="0" algn="ctr" defTabSz="1333500" rtl="0">
             <a:lnSpc>
               <a:spcPct val="90000"/>
             </a:lnSpc>
@@ -2775,7 +2845,7 @@
             <a:buNone/>
           </a:pPr>
           <a:r>
-            <a:rPr lang="pt-BR" sz="2700" kern="1200" noProof="0" dirty="0"/>
+            <a:rPr lang="pt-BR" sz="3000" kern="1200" noProof="0" dirty="0"/>
             <a:t>Título da etapa 4</a:t>
           </a:r>
         </a:p>
@@ -4190,7 +4260,7 @@
             <a:pPr rtl="0"/>
             <a:fld id="{F769B0D5-7F55-455B-B769-84B61581E250}" type="datetime1">
               <a:rPr lang="pt-BR" smtClean="0"/>
-              <a:t>29/03/2019</a:t>
+              <a:t>14/04/2019</a:t>
             </a:fld>
             <a:endParaRPr lang="pt-BR" dirty="0"/>
           </a:p>
@@ -4360,7 +4430,7 @@
             <a:pPr rtl="0"/>
             <a:fld id="{1AFE56F6-A70B-491B-A989-29E38C94819E}" type="datetime1">
               <a:rPr lang="pt-BR" noProof="0" smtClean="0"/>
-              <a:t>29/03/2019</a:t>
+              <a:t>14/04/2019</a:t>
             </a:fld>
             <a:endParaRPr lang="pt-BR" noProof="0" dirty="0"/>
           </a:p>
@@ -6349,7 +6419,7 @@
             <a:pPr rtl="0"/>
             <a:fld id="{ED540BCD-A9BE-4069-AF5C-2A3DFF693F79}" type="datetime1">
               <a:rPr lang="pt-BR" noProof="0" smtClean="0"/>
-              <a:t>29/03/2019</a:t>
+              <a:t>14/04/2019</a:t>
             </a:fld>
             <a:endParaRPr lang="pt-BR" noProof="0" dirty="0"/>
           </a:p>
@@ -6963,7 +7033,7 @@
             <a:pPr rtl="0"/>
             <a:fld id="{1CECCB52-40C2-4E99-85EA-E8A293866E2D}" type="datetime1">
               <a:rPr lang="pt-BR" noProof="0" smtClean="0"/>
-              <a:t>29/03/2019</a:t>
+              <a:t>14/04/2019</a:t>
             </a:fld>
             <a:endParaRPr lang="pt-BR" noProof="0" dirty="0"/>
           </a:p>
@@ -7152,7 +7222,7 @@
             <a:pPr rtl="0"/>
             <a:fld id="{E24EF33E-C11E-476F-ABF9-879EF9D37700}" type="datetime1">
               <a:rPr lang="pt-BR" noProof="0" smtClean="0"/>
-              <a:t>29/03/2019</a:t>
+              <a:t>14/04/2019</a:t>
             </a:fld>
             <a:endParaRPr lang="pt-BR" noProof="0" dirty="0"/>
           </a:p>
@@ -7491,7 +7561,7 @@
             <a:pPr rtl="0"/>
             <a:fld id="{AF3A9F66-FD54-49C7-9D08-483FEB75E766}" type="datetime1">
               <a:rPr lang="pt-BR" noProof="0" smtClean="0"/>
-              <a:t>29/03/2019</a:t>
+              <a:t>14/04/2019</a:t>
             </a:fld>
             <a:endParaRPr lang="pt-BR" noProof="0" dirty="0"/>
           </a:p>
@@ -7689,7 +7759,7 @@
             <a:pPr rtl="0"/>
             <a:fld id="{B76F022E-73DC-465B-A81F-663C39E9C6BC}" type="datetime1">
               <a:rPr lang="pt-BR" noProof="0" smtClean="0"/>
-              <a:t>29/03/2019</a:t>
+              <a:t>14/04/2019</a:t>
             </a:fld>
             <a:endParaRPr lang="pt-BR" noProof="0" dirty="0"/>
           </a:p>
@@ -8870,7 +8940,7 @@
             <a:pPr rtl="0"/>
             <a:fld id="{D032D7E7-0E3D-42EA-B60A-46262A5D0676}" type="datetime1">
               <a:rPr lang="pt-BR" noProof="0" smtClean="0"/>
-              <a:t>29/03/2019</a:t>
+              <a:t>14/04/2019</a:t>
             </a:fld>
             <a:endParaRPr lang="pt-BR" noProof="0" dirty="0"/>
           </a:p>
@@ -9260,7 +9330,7 @@
             <a:pPr rtl="0"/>
             <a:fld id="{A0DCB2DA-9F14-430D-AF4F-64B6EB5E00E7}" type="datetime1">
               <a:rPr lang="pt-BR" noProof="0" smtClean="0"/>
-              <a:t>29/03/2019</a:t>
+              <a:t>14/04/2019</a:t>
             </a:fld>
             <a:endParaRPr lang="pt-BR" noProof="0" dirty="0"/>
           </a:p>
@@ -9397,7 +9467,7 @@
             <a:pPr rtl="0"/>
             <a:fld id="{58A91CED-09DA-4ECE-92C8-759A4ED95185}" type="datetime1">
               <a:rPr lang="pt-BR" noProof="0" smtClean="0"/>
-              <a:t>29/03/2019</a:t>
+              <a:t>14/04/2019</a:t>
             </a:fld>
             <a:endParaRPr lang="pt-BR" noProof="0" dirty="0"/>
           </a:p>
@@ -9510,7 +9580,7 @@
             <a:pPr rtl="0"/>
             <a:fld id="{84518F8F-CA65-4BFD-A461-B66071DAF05B}" type="datetime1">
               <a:rPr lang="pt-BR" noProof="0" smtClean="0"/>
-              <a:t>29/03/2019</a:t>
+              <a:t>14/04/2019</a:t>
             </a:fld>
             <a:endParaRPr lang="pt-BR" noProof="0" dirty="0"/>
           </a:p>
@@ -9808,7 +9878,7 @@
             <a:pPr rtl="0"/>
             <a:fld id="{1FF51EBE-146A-4C5F-B6C5-AA4426FEB226}" type="datetime1">
               <a:rPr lang="pt-BR" noProof="0" smtClean="0"/>
-              <a:t>29/03/2019</a:t>
+              <a:t>14/04/2019</a:t>
             </a:fld>
             <a:endParaRPr lang="pt-BR" noProof="0" dirty="0"/>
           </a:p>
@@ -10192,7 +10262,7 @@
             <a:pPr rtl="0"/>
             <a:fld id="{AF879DE6-BF0A-412B-BA5D-89651B90F81D}" type="datetime1">
               <a:rPr lang="pt-BR" noProof="0" smtClean="0"/>
-              <a:t>29/03/2019</a:t>
+              <a:t>14/04/2019</a:t>
             </a:fld>
             <a:endParaRPr lang="pt-BR" noProof="0" dirty="0"/>
           </a:p>
@@ -10591,68 +10661,6 @@
           <a:chExt cx="0" cy="0"/>
         </a:xfrm>
       </p:grpSpPr>
-      <p:sp>
-        <p:nvSpPr>
-          <p:cNvPr id="2" name="Título 1"/>
-          <p:cNvSpPr>
-            <a:spLocks noGrp="1"/>
-          </p:cNvSpPr>
-          <p:nvPr>
-            <p:ph type="ctrTitle"/>
-          </p:nvPr>
-        </p:nvSpPr>
-        <p:spPr/>
-        <p:txBody>
-          <a:bodyPr rtlCol="0">
-            <a:normAutofit/>
-          </a:bodyPr>
-          <a:lstStyle/>
-          <a:p>
-            <a:pPr rtl="0"/>
-            <a:r>
-              <a:rPr lang="pt-BR" sz="6000" dirty="0">
-                <a:solidFill>
-                  <a:schemeClr val="tx1">
-                    <a:lumMod val="75000"/>
-                  </a:schemeClr>
-                </a:solidFill>
-                <a:latin typeface="Arial" panose="020B0604020202020204" pitchFamily="34" charset="0"/>
-                <a:cs typeface="Arial" panose="020B0604020202020204" pitchFamily="34" charset="0"/>
-              </a:rPr>
-              <a:t>LOGO</a:t>
-            </a:r>
-          </a:p>
-        </p:txBody>
-      </p:sp>
-      <p:sp>
-        <p:nvSpPr>
-          <p:cNvPr id="3" name="Subtítulo 2"/>
-          <p:cNvSpPr>
-            <a:spLocks noGrp="1"/>
-          </p:cNvSpPr>
-          <p:nvPr>
-            <p:ph type="subTitle" idx="1"/>
-          </p:nvPr>
-        </p:nvSpPr>
-        <p:spPr/>
-        <p:txBody>
-          <a:bodyPr rtlCol="0"/>
-          <a:lstStyle/>
-          <a:p>
-            <a:pPr rtl="0"/>
-            <a:r>
-              <a:rPr lang="pt-BR" dirty="0">
-                <a:solidFill>
-                  <a:schemeClr val="tx1">
-                    <a:lumMod val="75000"/>
-                  </a:schemeClr>
-                </a:solidFill>
-              </a:rPr>
-              <a:t>Slogan</a:t>
-            </a:r>
-          </a:p>
-        </p:txBody>
-      </p:sp>
       <p:pic>
         <p:nvPicPr>
           <p:cNvPr id="16" name="Espaço Reservado para Imagem 15" descr="Uma imagem contendo céu, ao ar livre, água, pessoa&#10;&#10;Descrição gerada automaticamente">
@@ -10681,6 +10689,72 @@
           </a:xfrm>
         </p:spPr>
       </p:pic>
+      <p:pic>
+        <p:nvPicPr>
+          <p:cNvPr id="7" name="Imagem 6">
+            <a:extLst>
+              <a:ext uri="{FF2B5EF4-FFF2-40B4-BE49-F238E27FC236}">
+                <a16:creationId xmlns:a16="http://schemas.microsoft.com/office/drawing/2014/main" id="{38A54163-7CFF-48B0-BF59-34DC25B5ACCE}"/>
+              </a:ext>
+            </a:extLst>
+          </p:cNvPr>
+          <p:cNvPicPr>
+            <a:picLocks noChangeAspect="1"/>
+          </p:cNvPicPr>
+          <p:nvPr/>
+        </p:nvPicPr>
+        <p:blipFill>
+          <a:blip r:embed="rId4"/>
+          <a:stretch>
+            <a:fillRect/>
+          </a:stretch>
+        </p:blipFill>
+        <p:spPr>
+          <a:xfrm>
+            <a:off x="567082" y="1863969"/>
+            <a:ext cx="5528918" cy="1959688"/>
+          </a:xfrm>
+          <a:prstGeom prst="rect">
+            <a:avLst/>
+          </a:prstGeom>
+        </p:spPr>
+      </p:pic>
+      <p:sp>
+        <p:nvSpPr>
+          <p:cNvPr id="3" name="Subtítulo 2"/>
+          <p:cNvSpPr>
+            <a:spLocks noGrp="1"/>
+          </p:cNvSpPr>
+          <p:nvPr>
+            <p:ph type="subTitle" idx="1"/>
+          </p:nvPr>
+        </p:nvSpPr>
+        <p:spPr>
+          <a:xfrm>
+            <a:off x="1649149" y="3296118"/>
+            <a:ext cx="4353066" cy="771790"/>
+          </a:xfrm>
+        </p:spPr>
+        <p:txBody>
+          <a:bodyPr rtlCol="0"/>
+          <a:lstStyle/>
+          <a:p>
+            <a:pPr rtl="0"/>
+            <a:r>
+              <a:rPr lang="pt-BR" b="1" dirty="0">
+                <a:solidFill>
+                  <a:schemeClr val="tx1">
+                    <a:lumMod val="75000"/>
+                  </a:schemeClr>
+                </a:solidFill>
+                <a:latin typeface="Segoe UI" panose="020B0502040204020203" pitchFamily="34" charset="0"/>
+                <a:cs typeface="Segoe UI" panose="020B0502040204020203" pitchFamily="34" charset="0"/>
+              </a:rPr>
+              <a:t>Soluções para produtividade</a:t>
+            </a:r>
+          </a:p>
+        </p:txBody>
+      </p:sp>
     </p:spTree>
     <p:extLst>
       <p:ext uri="{BB962C8B-B14F-4D97-AF65-F5344CB8AC3E}">
@@ -11211,7 +11285,7 @@
             <p:ph idx="1"/>
             <p:extLst>
               <p:ext uri="{D42A27DB-BD31-4B8C-83A1-F6EECF244321}">
-                <p14:modId xmlns:p14="http://schemas.microsoft.com/office/powerpoint/2010/main" val="3352398515"/>
+                <p14:modId xmlns:p14="http://schemas.microsoft.com/office/powerpoint/2010/main" val="3788173342"/>
               </p:ext>
             </p:extLst>
           </p:nvPr>
@@ -12079,9 +12153,9 @@
 <file path=ppt/theme/theme1.xml><?xml version="1.0" encoding="utf-8"?>
 <a:theme xmlns:a="http://schemas.openxmlformats.org/drawingml/2006/main" name="Direção de Vendas 16:9">
   <a:themeElements>
-    <a:clrScheme name="Personalizada 6">
+    <a:clrScheme name="Personalizada 2">
       <a:dk1>
-        <a:srgbClr val="BFBFBF"/>
+        <a:srgbClr val="3F3F3F"/>
       </a:dk1>
       <a:lt1>
         <a:sysClr val="window" lastClr="FFFFFF"/>
@@ -12093,40 +12167,100 @@
         <a:srgbClr val="F9F9F9"/>
       </a:lt2>
       <a:accent1>
-        <a:srgbClr val="23D5ED"/>
+        <a:srgbClr val="C7E1F0"/>
       </a:accent1>
       <a:accent2>
-        <a:srgbClr val="4971F1"/>
+        <a:srgbClr val="34A1C4"/>
       </a:accent2>
       <a:accent3>
-        <a:srgbClr val="EFC119"/>
+        <a:srgbClr val="227ABA"/>
       </a:accent3>
       <a:accent4>
-        <a:srgbClr val="969890"/>
+        <a:srgbClr val="5F5F5F"/>
       </a:accent4>
       <a:accent5>
         <a:srgbClr val="69E0E7"/>
       </a:accent5>
       <a:accent6>
-        <a:srgbClr val="C05A3A"/>
+        <a:srgbClr val="006095"/>
       </a:accent6>
       <a:hlink>
-        <a:srgbClr val="EFC119"/>
+        <a:srgbClr val="227ABA"/>
       </a:hlink>
       <a:folHlink>
         <a:srgbClr val="969890"/>
       </a:folHlink>
     </a:clrScheme>
-    <a:fontScheme name="Book Antiqua">
+    <a:fontScheme name="Calibri">
       <a:majorFont>
-        <a:latin typeface="Book Antiqua"/>
+        <a:latin typeface="Calibri" panose="020F0502020204030204"/>
         <a:ea typeface=""/>
         <a:cs typeface=""/>
+        <a:font script="Jpan" typeface="メイリオ"/>
+        <a:font script="Hang" typeface="맑은 고딕"/>
+        <a:font script="Hans" typeface="宋体"/>
+        <a:font script="Hant" typeface="新細明體"/>
+        <a:font script="Arab" typeface="Arial"/>
+        <a:font script="Hebr" typeface="Arial"/>
+        <a:font script="Thai" typeface="Cordia New"/>
+        <a:font script="Ethi" typeface="Nyala"/>
+        <a:font script="Beng" typeface="Vrinda"/>
+        <a:font script="Gujr" typeface="Shruti"/>
+        <a:font script="Khmr" typeface="DaunPenh"/>
+        <a:font script="Knda" typeface="Tunga"/>
+        <a:font script="Guru" typeface="Raavi"/>
+        <a:font script="Cans" typeface="Euphemia"/>
+        <a:font script="Cher" typeface="Plantagenet Cherokee"/>
+        <a:font script="Yiii" typeface="Microsoft Yi Baiti"/>
+        <a:font script="Tibt" typeface="Microsoft Himalaya"/>
+        <a:font script="Thaa" typeface="MV Boli"/>
+        <a:font script="Deva" typeface="Mangal"/>
+        <a:font script="Telu" typeface="Gautami"/>
+        <a:font script="Taml" typeface="Latha"/>
+        <a:font script="Syrc" typeface="Estrangelo Edessa"/>
+        <a:font script="Orya" typeface="Kalinga"/>
+        <a:font script="Mlym" typeface="Kartika"/>
+        <a:font script="Laoo" typeface="DokChampa"/>
+        <a:font script="Sinh" typeface="Iskoola Pota"/>
+        <a:font script="Mong" typeface="Mongolian Baiti"/>
+        <a:font script="Viet" typeface="Tahoma"/>
+        <a:font script="Uigh" typeface="Microsoft Uighur"/>
+        <a:font script="Geor" typeface="Sylfaen"/>
       </a:majorFont>
       <a:minorFont>
-        <a:latin typeface="Book Antiqua"/>
+        <a:latin typeface="Calibri" panose="020F0502020204030204"/>
         <a:ea typeface=""/>
         <a:cs typeface=""/>
+        <a:font script="Jpan" typeface="メイリオ"/>
+        <a:font script="Hang" typeface="맑은 고딕"/>
+        <a:font script="Hans" typeface="宋体"/>
+        <a:font script="Hant" typeface="新細明體"/>
+        <a:font script="Arab" typeface="Arial"/>
+        <a:font script="Hebr" typeface="Arial"/>
+        <a:font script="Thai" typeface="Cordia New"/>
+        <a:font script="Ethi" typeface="Nyala"/>
+        <a:font script="Beng" typeface="Vrinda"/>
+        <a:font script="Gujr" typeface="Shruti"/>
+        <a:font script="Khmr" typeface="DaunPenh"/>
+        <a:font script="Knda" typeface="Tunga"/>
+        <a:font script="Guru" typeface="Raavi"/>
+        <a:font script="Cans" typeface="Euphemia"/>
+        <a:font script="Cher" typeface="Plantagenet Cherokee"/>
+        <a:font script="Yiii" typeface="Microsoft Yi Baiti"/>
+        <a:font script="Tibt" typeface="Microsoft Himalaya"/>
+        <a:font script="Thaa" typeface="MV Boli"/>
+        <a:font script="Deva" typeface="Mangal"/>
+        <a:font script="Telu" typeface="Gautami"/>
+        <a:font script="Taml" typeface="Latha"/>
+        <a:font script="Syrc" typeface="Estrangelo Edessa"/>
+        <a:font script="Orya" typeface="Kalinga"/>
+        <a:font script="Mlym" typeface="Kartika"/>
+        <a:font script="Laoo" typeface="DokChampa"/>
+        <a:font script="Sinh" typeface="Iskoola Pota"/>
+        <a:font script="Mong" typeface="Mongolian Baiti"/>
+        <a:font script="Viet" typeface="Tahoma"/>
+        <a:font script="Uigh" typeface="Microsoft Uighur"/>
+        <a:font script="Geor" typeface="Sylfaen"/>
       </a:minorFont>
     </a:fontScheme>
     <a:fmtScheme name="Office">

</xml_diff>

<commit_message>
Comeco do PPT @virtohoho e @gusth2019
</commit_message>
<xml_diff>
--- a/documentacao/PowerPoint.pptx
+++ b/documentacao/PowerPoint.pptx
@@ -5,25 +5,26 @@
     <p:sldMasterId id="2147483648" r:id="rId1"/>
   </p:sldMasterIdLst>
   <p:notesMasterIdLst>
-    <p:notesMasterId r:id="rId15"/>
+    <p:notesMasterId r:id="rId16"/>
   </p:notesMasterIdLst>
   <p:handoutMasterIdLst>
-    <p:handoutMasterId r:id="rId16"/>
+    <p:handoutMasterId r:id="rId17"/>
   </p:handoutMasterIdLst>
   <p:sldIdLst>
     <p:sldId id="257" r:id="rId2"/>
     <p:sldId id="258" r:id="rId3"/>
     <p:sldId id="259" r:id="rId4"/>
-    <p:sldId id="260" r:id="rId5"/>
-    <p:sldId id="261" r:id="rId6"/>
-    <p:sldId id="262" r:id="rId7"/>
-    <p:sldId id="263" r:id="rId8"/>
-    <p:sldId id="264" r:id="rId9"/>
-    <p:sldId id="265" r:id="rId10"/>
-    <p:sldId id="266" r:id="rId11"/>
-    <p:sldId id="267" r:id="rId12"/>
-    <p:sldId id="268" r:id="rId13"/>
-    <p:sldId id="269" r:id="rId14"/>
+    <p:sldId id="270" r:id="rId5"/>
+    <p:sldId id="260" r:id="rId6"/>
+    <p:sldId id="261" r:id="rId7"/>
+    <p:sldId id="262" r:id="rId8"/>
+    <p:sldId id="263" r:id="rId9"/>
+    <p:sldId id="264" r:id="rId10"/>
+    <p:sldId id="265" r:id="rId11"/>
+    <p:sldId id="266" r:id="rId12"/>
+    <p:sldId id="267" r:id="rId13"/>
+    <p:sldId id="268" r:id="rId14"/>
+    <p:sldId id="269" r:id="rId15"/>
   </p:sldIdLst>
   <p:sldSz cx="12192000" cy="6858000"/>
   <p:notesSz cx="6858000" cy="9144000"/>
@@ -312,7 +313,9 @@
               </c:spPr>
             </c:leaderLines>
             <c:extLst>
-              <c:ext xmlns:c15="http://schemas.microsoft.com/office/drawing/2012/chart" uri="{CE6537A1-D6FC-4f65-9D91-7224C49458BB}"/>
+              <c:ext xmlns:c15="http://schemas.microsoft.com/office/drawing/2012/chart" uri="{CE6537A1-D6FC-4f65-9D91-7224C49458BB}">
+                <c15:layout/>
+              </c:ext>
             </c:extLst>
           </c:dLbls>
           <c:cat>
@@ -804,6 +807,7 @@
     </c:plotArea>
     <c:legend>
       <c:legendPos val="b"/>
+      <c:layout/>
       <c:overlay val="0"/>
       <c:spPr>
         <a:solidFill>
@@ -2459,6 +2463,13 @@
         </dgm:presLayoutVars>
       </dgm:prSet>
       <dgm:spPr/>
+      <dgm:t>
+        <a:bodyPr/>
+        <a:lstStyle/>
+        <a:p>
+          <a:endParaRPr lang="pt-BR"/>
+        </a:p>
+      </dgm:t>
     </dgm:pt>
     <dgm:pt modelId="{705DFC51-4C30-4A07-9F0C-6EB770961C6F}" type="pres">
       <dgm:prSet presAssocID="{6CFF1BD9-AE1F-4488-8B72-01186EADA6FF}" presName="parTxOnlySpace" presStyleCnt="0"/>
@@ -2473,6 +2484,13 @@
         </dgm:presLayoutVars>
       </dgm:prSet>
       <dgm:spPr/>
+      <dgm:t>
+        <a:bodyPr/>
+        <a:lstStyle/>
+        <a:p>
+          <a:endParaRPr lang="pt-BR"/>
+        </a:p>
+      </dgm:t>
     </dgm:pt>
     <dgm:pt modelId="{01C6BCDE-530E-4D03-9CF5-9AB36CDC1FE1}" type="pres">
       <dgm:prSet presAssocID="{E1826C46-15A2-4345-B986-53D05F21F155}" presName="parTxOnlySpace" presStyleCnt="0"/>
@@ -2487,6 +2505,13 @@
         </dgm:presLayoutVars>
       </dgm:prSet>
       <dgm:spPr/>
+      <dgm:t>
+        <a:bodyPr/>
+        <a:lstStyle/>
+        <a:p>
+          <a:endParaRPr lang="pt-BR"/>
+        </a:p>
+      </dgm:t>
     </dgm:pt>
     <dgm:pt modelId="{8CB78EC1-7B74-4B6E-94C6-5F808A049A1F}" type="pres">
       <dgm:prSet presAssocID="{B6438016-7365-4FC0-A372-D90585B4B6EE}" presName="parTxOnlySpace" presStyleCnt="0"/>
@@ -2501,18 +2526,25 @@
         </dgm:presLayoutVars>
       </dgm:prSet>
       <dgm:spPr/>
+      <dgm:t>
+        <a:bodyPr/>
+        <a:lstStyle/>
+        <a:p>
+          <a:endParaRPr lang="pt-BR"/>
+        </a:p>
+      </dgm:t>
     </dgm:pt>
   </dgm:ptLst>
   <dgm:cxnLst>
+    <dgm:cxn modelId="{B8B909D0-D4F6-48D4-81DA-A58F34AE3646}" srcId="{44156040-AF98-4F2C-9909-9F2439F6F588}" destId="{A8B05E70-CCF1-4080-8EEE-6873C9D4B630}" srcOrd="2" destOrd="0" parTransId="{11D1F3D3-0002-4131-9F84-22FBF8692DA9}" sibTransId="{B6438016-7365-4FC0-A372-D90585B4B6EE}"/>
+    <dgm:cxn modelId="{777DC3C6-D336-4C94-A624-E5582A07ECAA}" srcId="{44156040-AF98-4F2C-9909-9F2439F6F588}" destId="{42147153-A6C2-4177-BA7D-2ACCC2C1B2F7}" srcOrd="3" destOrd="0" parTransId="{C6F68745-4C20-4204-96A6-585691399C14}" sibTransId="{0C6B132F-0347-46BA-86A4-3FAFB6676411}"/>
     <dgm:cxn modelId="{BF4A375F-A05B-45C3-9731-23DBACB9FC02}" type="presOf" srcId="{12E26E22-71B0-4386-A84F-ABF2FF66A99F}" destId="{919A589F-F74A-40C3-BE88-AB8730BCAB04}" srcOrd="0" destOrd="0" presId="urn:microsoft.com/office/officeart/2005/8/layout/chevron1"/>
     <dgm:cxn modelId="{B0E2386F-A443-4201-8130-FB9CC25AA154}" srcId="{44156040-AF98-4F2C-9909-9F2439F6F588}" destId="{74020AF3-C700-4606-8917-C6A353D7963A}" srcOrd="0" destOrd="0" parTransId="{87D99D21-0B4A-4259-89FB-0E5941CB535C}" sibTransId="{6CFF1BD9-AE1F-4488-8B72-01186EADA6FF}"/>
+    <dgm:cxn modelId="{937639B3-2352-48E4-A96B-F63DF2119D92}" srcId="{44156040-AF98-4F2C-9909-9F2439F6F588}" destId="{12E26E22-71B0-4386-A84F-ABF2FF66A99F}" srcOrd="1" destOrd="0" parTransId="{3A6CB3CB-0F71-4CA8-93AA-0E3E3D59D313}" sibTransId="{E1826C46-15A2-4345-B986-53D05F21F155}"/>
     <dgm:cxn modelId="{BB4F9699-C9DE-46C4-A04B-CD52EF57D4C5}" type="presOf" srcId="{74020AF3-C700-4606-8917-C6A353D7963A}" destId="{881B8FEC-9D20-4669-BB2E-FA9CEA0BE5A9}" srcOrd="0" destOrd="0" presId="urn:microsoft.com/office/officeart/2005/8/layout/chevron1"/>
+    <dgm:cxn modelId="{383A5CFE-2D64-4002-A7C0-1E621409BFD6}" type="presOf" srcId="{44156040-AF98-4F2C-9909-9F2439F6F588}" destId="{1C61A9A2-33F2-469B-8AC4-A104A5A98D78}" srcOrd="0" destOrd="0" presId="urn:microsoft.com/office/officeart/2005/8/layout/chevron1"/>
     <dgm:cxn modelId="{9E75EA9C-2122-47C1-897A-5BBDE8D78AC4}" type="presOf" srcId="{A8B05E70-CCF1-4080-8EEE-6873C9D4B630}" destId="{268F2328-4548-422B-9C65-80797E16B241}" srcOrd="0" destOrd="0" presId="urn:microsoft.com/office/officeart/2005/8/layout/chevron1"/>
-    <dgm:cxn modelId="{937639B3-2352-48E4-A96B-F63DF2119D92}" srcId="{44156040-AF98-4F2C-9909-9F2439F6F588}" destId="{12E26E22-71B0-4386-A84F-ABF2FF66A99F}" srcOrd="1" destOrd="0" parTransId="{3A6CB3CB-0F71-4CA8-93AA-0E3E3D59D313}" sibTransId="{E1826C46-15A2-4345-B986-53D05F21F155}"/>
     <dgm:cxn modelId="{37A858B6-D71C-4E86-A467-E8D17167DE19}" type="presOf" srcId="{42147153-A6C2-4177-BA7D-2ACCC2C1B2F7}" destId="{BDD0B0F7-A87C-4B5B-A4C3-4E4BE6EB0FE4}" srcOrd="0" destOrd="0" presId="urn:microsoft.com/office/officeart/2005/8/layout/chevron1"/>
-    <dgm:cxn modelId="{777DC3C6-D336-4C94-A624-E5582A07ECAA}" srcId="{44156040-AF98-4F2C-9909-9F2439F6F588}" destId="{42147153-A6C2-4177-BA7D-2ACCC2C1B2F7}" srcOrd="3" destOrd="0" parTransId="{C6F68745-4C20-4204-96A6-585691399C14}" sibTransId="{0C6B132F-0347-46BA-86A4-3FAFB6676411}"/>
-    <dgm:cxn modelId="{B8B909D0-D4F6-48D4-81DA-A58F34AE3646}" srcId="{44156040-AF98-4F2C-9909-9F2439F6F588}" destId="{A8B05E70-CCF1-4080-8EEE-6873C9D4B630}" srcOrd="2" destOrd="0" parTransId="{11D1F3D3-0002-4131-9F84-22FBF8692DA9}" sibTransId="{B6438016-7365-4FC0-A372-D90585B4B6EE}"/>
-    <dgm:cxn modelId="{383A5CFE-2D64-4002-A7C0-1E621409BFD6}" type="presOf" srcId="{44156040-AF98-4F2C-9909-9F2439F6F588}" destId="{1C61A9A2-33F2-469B-8AC4-A104A5A98D78}" srcOrd="0" destOrd="0" presId="urn:microsoft.com/office/officeart/2005/8/layout/chevron1"/>
     <dgm:cxn modelId="{EDA037DE-3D60-46A9-9DDB-074A05981F8D}" type="presParOf" srcId="{1C61A9A2-33F2-469B-8AC4-A104A5A98D78}" destId="{881B8FEC-9D20-4669-BB2E-FA9CEA0BE5A9}" srcOrd="0" destOrd="0" presId="urn:microsoft.com/office/officeart/2005/8/layout/chevron1"/>
     <dgm:cxn modelId="{8F2A48B2-4519-4F7D-931D-1EB2DDCF4663}" type="presParOf" srcId="{1C61A9A2-33F2-469B-8AC4-A104A5A98D78}" destId="{705DFC51-4C30-4A07-9F0C-6EB770961C6F}" srcOrd="1" destOrd="0" presId="urn:microsoft.com/office/officeart/2005/8/layout/chevron1"/>
     <dgm:cxn modelId="{A8C49188-74D0-46A6-A671-569711775D6B}" type="presParOf" srcId="{1C61A9A2-33F2-469B-8AC4-A104A5A98D78}" destId="{919A589F-F74A-40C3-BE88-AB8730BCAB04}" srcOrd="2" destOrd="0" presId="urn:microsoft.com/office/officeart/2005/8/layout/chevron1"/>
@@ -2595,7 +2627,7 @@
         </a:bodyPr>
         <a:lstStyle/>
         <a:p>
-          <a:pPr marL="0" lvl="0" indent="0" algn="ctr" defTabSz="1333500" rtl="0">
+          <a:pPr lvl="0" algn="ctr" defTabSz="1333500" rtl="0">
             <a:lnSpc>
               <a:spcPct val="90000"/>
             </a:lnSpc>
@@ -2605,7 +2637,6 @@
             <a:spcAft>
               <a:spcPct val="35000"/>
             </a:spcAft>
-            <a:buNone/>
           </a:pPr>
           <a:r>
             <a:rPr lang="pt-BR" sz="3000" kern="1200" noProof="0" dirty="0"/>
@@ -2674,7 +2705,7 @@
         </a:bodyPr>
         <a:lstStyle/>
         <a:p>
-          <a:pPr marL="0" lvl="0" indent="0" algn="ctr" defTabSz="1333500" rtl="0">
+          <a:pPr lvl="0" algn="ctr" defTabSz="1333500" rtl="0">
             <a:lnSpc>
               <a:spcPct val="90000"/>
             </a:lnSpc>
@@ -2684,7 +2715,6 @@
             <a:spcAft>
               <a:spcPct val="35000"/>
             </a:spcAft>
-            <a:buNone/>
           </a:pPr>
           <a:r>
             <a:rPr lang="pt-BR" sz="3000" kern="1200" noProof="0" dirty="0"/>
@@ -2753,7 +2783,7 @@
         </a:bodyPr>
         <a:lstStyle/>
         <a:p>
-          <a:pPr marL="0" lvl="0" indent="0" algn="ctr" defTabSz="1333500" rtl="0">
+          <a:pPr lvl="0" algn="ctr" defTabSz="1333500" rtl="0">
             <a:lnSpc>
               <a:spcPct val="90000"/>
             </a:lnSpc>
@@ -2763,7 +2793,6 @@
             <a:spcAft>
               <a:spcPct val="35000"/>
             </a:spcAft>
-            <a:buNone/>
           </a:pPr>
           <a:r>
             <a:rPr lang="pt-BR" sz="3000" kern="1200" noProof="0" dirty="0"/>
@@ -2832,7 +2861,7 @@
         </a:bodyPr>
         <a:lstStyle/>
         <a:p>
-          <a:pPr marL="0" lvl="0" indent="0" algn="ctr" defTabSz="1333500" rtl="0">
+          <a:pPr lvl="0" algn="ctr" defTabSz="1333500" rtl="0">
             <a:lnSpc>
               <a:spcPct val="90000"/>
             </a:lnSpc>
@@ -2842,7 +2871,6 @@
             <a:spcAft>
               <a:spcPct val="35000"/>
             </a:spcAft>
-            <a:buNone/>
           </a:pPr>
           <a:r>
             <a:rPr lang="pt-BR" sz="3000" kern="1200" noProof="0" dirty="0"/>
@@ -4260,7 +4288,7 @@
             <a:pPr rtl="0"/>
             <a:fld id="{F769B0D5-7F55-455B-B769-84B61581E250}" type="datetime1">
               <a:rPr lang="pt-BR" smtClean="0"/>
-              <a:t>14/04/2019</a:t>
+              <a:t>15/04/2019</a:t>
             </a:fld>
             <a:endParaRPr lang="pt-BR" dirty="0"/>
           </a:p>
@@ -4430,7 +4458,7 @@
             <a:pPr rtl="0"/>
             <a:fld id="{1AFE56F6-A70B-491B-A989-29E38C94819E}" type="datetime1">
               <a:rPr lang="pt-BR" noProof="0" smtClean="0"/>
-              <a:t>14/04/2019</a:t>
+              <a:t>15/04/2019</a:t>
             </a:fld>
             <a:endParaRPr lang="pt-BR" noProof="0" dirty="0"/>
           </a:p>
@@ -4872,7 +4900,7 @@
     </p:spTree>
     <p:extLst>
       <p:ext uri="{BB962C8B-B14F-4D97-AF65-F5344CB8AC3E}">
-        <p14:creationId xmlns:p14="http://schemas.microsoft.com/office/powerpoint/2010/main" val="3584379344"/>
+        <p14:creationId xmlns:p14="http://schemas.microsoft.com/office/powerpoint/2010/main" val="1405629098"/>
       </p:ext>
     </p:extLst>
   </p:cSld>
@@ -4957,7 +4985,7 @@
     </p:spTree>
     <p:extLst>
       <p:ext uri="{BB962C8B-B14F-4D97-AF65-F5344CB8AC3E}">
-        <p14:creationId xmlns:p14="http://schemas.microsoft.com/office/powerpoint/2010/main" val="180770049"/>
+        <p14:creationId xmlns:p14="http://schemas.microsoft.com/office/powerpoint/2010/main" val="3584379344"/>
       </p:ext>
     </p:extLst>
   </p:cSld>
@@ -5042,7 +5070,7 @@
     </p:spTree>
     <p:extLst>
       <p:ext uri="{BB962C8B-B14F-4D97-AF65-F5344CB8AC3E}">
-        <p14:creationId xmlns:p14="http://schemas.microsoft.com/office/powerpoint/2010/main" val="791221967"/>
+        <p14:creationId xmlns:p14="http://schemas.microsoft.com/office/powerpoint/2010/main" val="180770049"/>
       </p:ext>
     </p:extLst>
   </p:cSld>
@@ -5119,6 +5147,91 @@
             <a:fld id="{1B9A179D-2D27-49E2-B022-8EDDA2EFE682}" type="slidenum">
               <a:rPr lang="pt-BR" smtClean="0"/>
               <a:t>13</a:t>
+            </a:fld>
+            <a:endParaRPr lang="pt-BR" dirty="0"/>
+          </a:p>
+        </p:txBody>
+      </p:sp>
+    </p:spTree>
+    <p:extLst>
+      <p:ext uri="{BB962C8B-B14F-4D97-AF65-F5344CB8AC3E}">
+        <p14:creationId xmlns:p14="http://schemas.microsoft.com/office/powerpoint/2010/main" val="791221967"/>
+      </p:ext>
+    </p:extLst>
+  </p:cSld>
+  <p:clrMapOvr>
+    <a:masterClrMapping/>
+  </p:clrMapOvr>
+</p:notes>
+</file>
+
+<file path=ppt/notesSlides/notesSlide14.xml><?xml version="1.0" encoding="utf-8"?>
+<p:notes xmlns:a="http://schemas.openxmlformats.org/drawingml/2006/main" xmlns:r="http://schemas.openxmlformats.org/officeDocument/2006/relationships" xmlns:p="http://schemas.openxmlformats.org/presentationml/2006/main">
+  <p:cSld>
+    <p:spTree>
+      <p:nvGrpSpPr>
+        <p:cNvPr id="1" name=""/>
+        <p:cNvGrpSpPr/>
+        <p:nvPr/>
+      </p:nvGrpSpPr>
+      <p:grpSpPr>
+        <a:xfrm>
+          <a:off x="0" y="0"/>
+          <a:ext cx="0" cy="0"/>
+          <a:chOff x="0" y="0"/>
+          <a:chExt cx="0" cy="0"/>
+        </a:xfrm>
+      </p:grpSpPr>
+      <p:sp>
+        <p:nvSpPr>
+          <p:cNvPr id="2" name="Espaço Reservado para Imagem de Slide 1"/>
+          <p:cNvSpPr>
+            <a:spLocks noGrp="1" noRot="1" noChangeAspect="1"/>
+          </p:cNvSpPr>
+          <p:nvPr>
+            <p:ph type="sldImg"/>
+          </p:nvPr>
+        </p:nvSpPr>
+        <p:spPr/>
+      </p:sp>
+      <p:sp>
+        <p:nvSpPr>
+          <p:cNvPr id="3" name="Espaço Reservado para Anotações 2"/>
+          <p:cNvSpPr>
+            <a:spLocks noGrp="1"/>
+          </p:cNvSpPr>
+          <p:nvPr>
+            <p:ph type="body" idx="1"/>
+          </p:nvPr>
+        </p:nvSpPr>
+        <p:spPr/>
+        <p:txBody>
+          <a:bodyPr/>
+          <a:lstStyle/>
+          <a:p>
+            <a:endParaRPr lang="pt-BR" dirty="0"/>
+          </a:p>
+        </p:txBody>
+      </p:sp>
+      <p:sp>
+        <p:nvSpPr>
+          <p:cNvPr id="4" name="Espaço Reservado para Número de Slide 3"/>
+          <p:cNvSpPr>
+            <a:spLocks noGrp="1"/>
+          </p:cNvSpPr>
+          <p:nvPr>
+            <p:ph type="sldNum" sz="quarter" idx="10"/>
+          </p:nvPr>
+        </p:nvSpPr>
+        <p:spPr/>
+        <p:txBody>
+          <a:bodyPr/>
+          <a:lstStyle/>
+          <a:p>
+            <a:pPr rtl="0"/>
+            <a:fld id="{1B9A179D-2D27-49E2-B022-8EDDA2EFE682}" type="slidenum">
+              <a:rPr lang="pt-BR" smtClean="0"/>
+              <a:t>14</a:t>
             </a:fld>
             <a:endParaRPr lang="pt-BR" dirty="0"/>
           </a:p>
@@ -5382,7 +5495,7 @@
     </p:spTree>
     <p:extLst>
       <p:ext uri="{BB962C8B-B14F-4D97-AF65-F5344CB8AC3E}">
-        <p14:creationId xmlns:p14="http://schemas.microsoft.com/office/powerpoint/2010/main" val="3579125351"/>
+        <p14:creationId xmlns:p14="http://schemas.microsoft.com/office/powerpoint/2010/main" val="3851932273"/>
       </p:ext>
     </p:extLst>
   </p:cSld>
@@ -5467,7 +5580,7 @@
     </p:spTree>
     <p:extLst>
       <p:ext uri="{BB962C8B-B14F-4D97-AF65-F5344CB8AC3E}">
-        <p14:creationId xmlns:p14="http://schemas.microsoft.com/office/powerpoint/2010/main" val="715395530"/>
+        <p14:creationId xmlns:p14="http://schemas.microsoft.com/office/powerpoint/2010/main" val="3579125351"/>
       </p:ext>
     </p:extLst>
   </p:cSld>
@@ -5552,7 +5665,7 @@
     </p:spTree>
     <p:extLst>
       <p:ext uri="{BB962C8B-B14F-4D97-AF65-F5344CB8AC3E}">
-        <p14:creationId xmlns:p14="http://schemas.microsoft.com/office/powerpoint/2010/main" val="730316551"/>
+        <p14:creationId xmlns:p14="http://schemas.microsoft.com/office/powerpoint/2010/main" val="715395530"/>
       </p:ext>
     </p:extLst>
   </p:cSld>
@@ -5637,7 +5750,7 @@
     </p:spTree>
     <p:extLst>
       <p:ext uri="{BB962C8B-B14F-4D97-AF65-F5344CB8AC3E}">
-        <p14:creationId xmlns:p14="http://schemas.microsoft.com/office/powerpoint/2010/main" val="4155057352"/>
+        <p14:creationId xmlns:p14="http://schemas.microsoft.com/office/powerpoint/2010/main" val="730316551"/>
       </p:ext>
     </p:extLst>
   </p:cSld>
@@ -5722,7 +5835,7 @@
     </p:spTree>
     <p:extLst>
       <p:ext uri="{BB962C8B-B14F-4D97-AF65-F5344CB8AC3E}">
-        <p14:creationId xmlns:p14="http://schemas.microsoft.com/office/powerpoint/2010/main" val="3094019052"/>
+        <p14:creationId xmlns:p14="http://schemas.microsoft.com/office/powerpoint/2010/main" val="4155057352"/>
       </p:ext>
     </p:extLst>
   </p:cSld>
@@ -5807,7 +5920,7 @@
     </p:spTree>
     <p:extLst>
       <p:ext uri="{BB962C8B-B14F-4D97-AF65-F5344CB8AC3E}">
-        <p14:creationId xmlns:p14="http://schemas.microsoft.com/office/powerpoint/2010/main" val="1405629098"/>
+        <p14:creationId xmlns:p14="http://schemas.microsoft.com/office/powerpoint/2010/main" val="3094019052"/>
       </p:ext>
     </p:extLst>
   </p:cSld>
@@ -6419,7 +6532,7 @@
             <a:pPr rtl="0"/>
             <a:fld id="{ED540BCD-A9BE-4069-AF5C-2A3DFF693F79}" type="datetime1">
               <a:rPr lang="pt-BR" noProof="0" smtClean="0"/>
-              <a:t>14/04/2019</a:t>
+              <a:t>15/04/2019</a:t>
             </a:fld>
             <a:endParaRPr lang="pt-BR" noProof="0" dirty="0"/>
           </a:p>
@@ -7033,7 +7146,7 @@
             <a:pPr rtl="0"/>
             <a:fld id="{1CECCB52-40C2-4E99-85EA-E8A293866E2D}" type="datetime1">
               <a:rPr lang="pt-BR" noProof="0" smtClean="0"/>
-              <a:t>14/04/2019</a:t>
+              <a:t>15/04/2019</a:t>
             </a:fld>
             <a:endParaRPr lang="pt-BR" noProof="0" dirty="0"/>
           </a:p>
@@ -7222,7 +7335,7 @@
             <a:pPr rtl="0"/>
             <a:fld id="{E24EF33E-C11E-476F-ABF9-879EF9D37700}" type="datetime1">
               <a:rPr lang="pt-BR" noProof="0" smtClean="0"/>
-              <a:t>14/04/2019</a:t>
+              <a:t>15/04/2019</a:t>
             </a:fld>
             <a:endParaRPr lang="pt-BR" noProof="0" dirty="0"/>
           </a:p>
@@ -7561,7 +7674,7 @@
             <a:pPr rtl="0"/>
             <a:fld id="{AF3A9F66-FD54-49C7-9D08-483FEB75E766}" type="datetime1">
               <a:rPr lang="pt-BR" noProof="0" smtClean="0"/>
-              <a:t>14/04/2019</a:t>
+              <a:t>15/04/2019</a:t>
             </a:fld>
             <a:endParaRPr lang="pt-BR" noProof="0" dirty="0"/>
           </a:p>
@@ -7759,7 +7872,7 @@
             <a:pPr rtl="0"/>
             <a:fld id="{B76F022E-73DC-465B-A81F-663C39E9C6BC}" type="datetime1">
               <a:rPr lang="pt-BR" noProof="0" smtClean="0"/>
-              <a:t>14/04/2019</a:t>
+              <a:t>15/04/2019</a:t>
             </a:fld>
             <a:endParaRPr lang="pt-BR" noProof="0" dirty="0"/>
           </a:p>
@@ -8940,7 +9053,7 @@
             <a:pPr rtl="0"/>
             <a:fld id="{D032D7E7-0E3D-42EA-B60A-46262A5D0676}" type="datetime1">
               <a:rPr lang="pt-BR" noProof="0" smtClean="0"/>
-              <a:t>14/04/2019</a:t>
+              <a:t>15/04/2019</a:t>
             </a:fld>
             <a:endParaRPr lang="pt-BR" noProof="0" dirty="0"/>
           </a:p>
@@ -9330,7 +9443,7 @@
             <a:pPr rtl="0"/>
             <a:fld id="{A0DCB2DA-9F14-430D-AF4F-64B6EB5E00E7}" type="datetime1">
               <a:rPr lang="pt-BR" noProof="0" smtClean="0"/>
-              <a:t>14/04/2019</a:t>
+              <a:t>15/04/2019</a:t>
             </a:fld>
             <a:endParaRPr lang="pt-BR" noProof="0" dirty="0"/>
           </a:p>
@@ -9467,7 +9580,7 @@
             <a:pPr rtl="0"/>
             <a:fld id="{58A91CED-09DA-4ECE-92C8-759A4ED95185}" type="datetime1">
               <a:rPr lang="pt-BR" noProof="0" smtClean="0"/>
-              <a:t>14/04/2019</a:t>
+              <a:t>15/04/2019</a:t>
             </a:fld>
             <a:endParaRPr lang="pt-BR" noProof="0" dirty="0"/>
           </a:p>
@@ -9580,7 +9693,7 @@
             <a:pPr rtl="0"/>
             <a:fld id="{84518F8F-CA65-4BFD-A461-B66071DAF05B}" type="datetime1">
               <a:rPr lang="pt-BR" noProof="0" smtClean="0"/>
-              <a:t>14/04/2019</a:t>
+              <a:t>15/04/2019</a:t>
             </a:fld>
             <a:endParaRPr lang="pt-BR" noProof="0" dirty="0"/>
           </a:p>
@@ -9878,7 +9991,7 @@
             <a:pPr rtl="0"/>
             <a:fld id="{1FF51EBE-146A-4C5F-B6C5-AA4426FEB226}" type="datetime1">
               <a:rPr lang="pt-BR" noProof="0" smtClean="0"/>
-              <a:t>14/04/2019</a:t>
+              <a:t>15/04/2019</a:t>
             </a:fld>
             <a:endParaRPr lang="pt-BR" noProof="0" dirty="0"/>
           </a:p>
@@ -10262,7 +10375,7 @@
             <a:pPr rtl="0"/>
             <a:fld id="{AF879DE6-BF0A-412B-BA5D-89651B90F81D}" type="datetime1">
               <a:rPr lang="pt-BR" noProof="0" smtClean="0"/>
-              <a:t>14/04/2019</a:t>
+              <a:t>15/04/2019</a:t>
             </a:fld>
             <a:endParaRPr lang="pt-BR" noProof="0" dirty="0"/>
           </a:p>
@@ -10797,10 +10910,33 @@
           <a:chExt cx="0" cy="0"/>
         </a:xfrm>
       </p:grpSpPr>
+      <p:sp>
+        <p:nvSpPr>
+          <p:cNvPr id="2" name="Título 1"/>
+          <p:cNvSpPr>
+            <a:spLocks noGrp="1"/>
+          </p:cNvSpPr>
+          <p:nvPr>
+            <p:ph type="title"/>
+          </p:nvPr>
+        </p:nvSpPr>
+        <p:spPr/>
+        <p:txBody>
+          <a:bodyPr rtlCol="0"/>
+          <a:lstStyle/>
+          <a:p>
+            <a:pPr rtl="0"/>
+            <a:r>
+              <a:rPr lang="pt-BR" dirty="0"/>
+              <a:t>Adicionar título de slide – 4</a:t>
+            </a:r>
+          </a:p>
+        </p:txBody>
+      </p:sp>
     </p:spTree>
     <p:extLst>
       <p:ext uri="{BB962C8B-B14F-4D97-AF65-F5344CB8AC3E}">
-        <p14:creationId xmlns:p14="http://schemas.microsoft.com/office/powerpoint/2010/main" val="1455343978"/>
+        <p14:creationId xmlns:p14="http://schemas.microsoft.com/office/powerpoint/2010/main" val="3061729273"/>
       </p:ext>
     </p:extLst>
   </p:cSld>
@@ -10839,73 +10975,10 @@
           <a:chExt cx="0" cy="0"/>
         </a:xfrm>
       </p:grpSpPr>
-      <p:sp>
-        <p:nvSpPr>
-          <p:cNvPr id="2" name="Título 1"/>
-          <p:cNvSpPr>
-            <a:spLocks noGrp="1"/>
-          </p:cNvSpPr>
-          <p:nvPr>
-            <p:ph type="title"/>
-          </p:nvPr>
-        </p:nvSpPr>
-        <p:spPr/>
-        <p:txBody>
-          <a:bodyPr rtlCol="0"/>
-          <a:lstStyle/>
-          <a:p>
-            <a:pPr rtl="0"/>
-            <a:r>
-              <a:rPr lang="pt-BR" dirty="0"/>
-              <a:t>Adicionar título de slide – 5</a:t>
-            </a:r>
-          </a:p>
-        </p:txBody>
-      </p:sp>
-      <p:sp>
-        <p:nvSpPr>
-          <p:cNvPr id="5" name="Espaço reservado para conteúdo 4"/>
-          <p:cNvSpPr>
-            <a:spLocks noGrp="1"/>
-          </p:cNvSpPr>
-          <p:nvPr>
-            <p:ph idx="1"/>
-          </p:nvPr>
-        </p:nvSpPr>
-        <p:spPr/>
-        <p:txBody>
-          <a:bodyPr rtlCol="0"/>
-          <a:lstStyle/>
-          <a:p>
-            <a:pPr rtl="0"/>
-            <a:endParaRPr lang="pt-BR" dirty="0"/>
-          </a:p>
-        </p:txBody>
-      </p:sp>
-      <p:sp>
-        <p:nvSpPr>
-          <p:cNvPr id="6" name="Espaço reservado para texto 5"/>
-          <p:cNvSpPr>
-            <a:spLocks noGrp="1"/>
-          </p:cNvSpPr>
-          <p:nvPr>
-            <p:ph type="body" sz="half" idx="2"/>
-          </p:nvPr>
-        </p:nvSpPr>
-        <p:spPr/>
-        <p:txBody>
-          <a:bodyPr rtlCol="0"/>
-          <a:lstStyle/>
-          <a:p>
-            <a:pPr rtl="0"/>
-            <a:endParaRPr lang="pt-BR" dirty="0"/>
-          </a:p>
-        </p:txBody>
-      </p:sp>
     </p:spTree>
     <p:extLst>
       <p:ext uri="{BB962C8B-B14F-4D97-AF65-F5344CB8AC3E}">
-        <p14:creationId xmlns:p14="http://schemas.microsoft.com/office/powerpoint/2010/main" val="332843759"/>
+        <p14:creationId xmlns:p14="http://schemas.microsoft.com/office/powerpoint/2010/main" val="1455343978"/>
       </p:ext>
     </p:extLst>
   </p:cSld>
@@ -10962,6 +11035,111 @@
             <a:pPr rtl="0"/>
             <a:r>
               <a:rPr lang="pt-BR" dirty="0"/>
+              <a:t>Adicionar título de slide – 5</a:t>
+            </a:r>
+          </a:p>
+        </p:txBody>
+      </p:sp>
+      <p:sp>
+        <p:nvSpPr>
+          <p:cNvPr id="5" name="Espaço reservado para conteúdo 4"/>
+          <p:cNvSpPr>
+            <a:spLocks noGrp="1"/>
+          </p:cNvSpPr>
+          <p:nvPr>
+            <p:ph idx="1"/>
+          </p:nvPr>
+        </p:nvSpPr>
+        <p:spPr/>
+        <p:txBody>
+          <a:bodyPr rtlCol="0"/>
+          <a:lstStyle/>
+          <a:p>
+            <a:pPr rtl="0"/>
+            <a:endParaRPr lang="pt-BR" dirty="0"/>
+          </a:p>
+        </p:txBody>
+      </p:sp>
+      <p:sp>
+        <p:nvSpPr>
+          <p:cNvPr id="6" name="Espaço reservado para texto 5"/>
+          <p:cNvSpPr>
+            <a:spLocks noGrp="1"/>
+          </p:cNvSpPr>
+          <p:nvPr>
+            <p:ph type="body" sz="half" idx="2"/>
+          </p:nvPr>
+        </p:nvSpPr>
+        <p:spPr/>
+        <p:txBody>
+          <a:bodyPr rtlCol="0"/>
+          <a:lstStyle/>
+          <a:p>
+            <a:pPr rtl="0"/>
+            <a:endParaRPr lang="pt-BR" dirty="0"/>
+          </a:p>
+        </p:txBody>
+      </p:sp>
+    </p:spTree>
+    <p:extLst>
+      <p:ext uri="{BB962C8B-B14F-4D97-AF65-F5344CB8AC3E}">
+        <p14:creationId xmlns:p14="http://schemas.microsoft.com/office/powerpoint/2010/main" val="332843759"/>
+      </p:ext>
+    </p:extLst>
+  </p:cSld>
+  <p:clrMapOvr>
+    <a:masterClrMapping/>
+  </p:clrMapOvr>
+  <mc:AlternateContent xmlns:mc="http://schemas.openxmlformats.org/markup-compatibility/2006" xmlns:p14="http://schemas.microsoft.com/office/powerpoint/2010/main">
+    <mc:Choice Requires="p14">
+      <p:transition spd="med" p14:dur="700">
+        <p:fade/>
+      </p:transition>
+    </mc:Choice>
+    <mc:Fallback xmlns="">
+      <p:transition spd="med">
+        <p:fade/>
+      </p:transition>
+    </mc:Fallback>
+  </mc:AlternateContent>
+</p:sld>
+</file>
+
+<file path=ppt/slides/slide13.xml><?xml version="1.0" encoding="utf-8"?>
+<p:sld xmlns:a="http://schemas.openxmlformats.org/drawingml/2006/main" xmlns:r="http://schemas.openxmlformats.org/officeDocument/2006/relationships" xmlns:p="http://schemas.openxmlformats.org/presentationml/2006/main">
+  <p:cSld>
+    <p:spTree>
+      <p:nvGrpSpPr>
+        <p:cNvPr id="1" name=""/>
+        <p:cNvGrpSpPr/>
+        <p:nvPr/>
+      </p:nvGrpSpPr>
+      <p:grpSpPr>
+        <a:xfrm>
+          <a:off x="0" y="0"/>
+          <a:ext cx="0" cy="0"/>
+          <a:chOff x="0" y="0"/>
+          <a:chExt cx="0" cy="0"/>
+        </a:xfrm>
+      </p:grpSpPr>
+      <p:sp>
+        <p:nvSpPr>
+          <p:cNvPr id="2" name="Título 1"/>
+          <p:cNvSpPr>
+            <a:spLocks noGrp="1"/>
+          </p:cNvSpPr>
+          <p:nvPr>
+            <p:ph type="title"/>
+          </p:nvPr>
+        </p:nvSpPr>
+        <p:spPr/>
+        <p:txBody>
+          <a:bodyPr rtlCol="0"/>
+          <a:lstStyle/>
+          <a:p>
+            <a:pPr rtl="0"/>
+            <a:r>
+              <a:rPr lang="pt-BR" dirty="0"/>
               <a:t>Adicionar título de slide – 6</a:t>
             </a:r>
           </a:p>
@@ -11024,7 +11202,7 @@
 </p:sld>
 </file>
 
-<file path=ppt/slides/slide13.xml><?xml version="1.0" encoding="utf-8"?>
+<file path=ppt/slides/slide14.xml><?xml version="1.0" encoding="utf-8"?>
 <p:sld xmlns:a="http://schemas.openxmlformats.org/drawingml/2006/main" xmlns:r="http://schemas.openxmlformats.org/officeDocument/2006/relationships" xmlns:p="http://schemas.openxmlformats.org/presentationml/2006/main">
   <p:cSld>
     <p:spTree>
@@ -11186,6 +11364,10 @@
           <a:lstStyle/>
           <a:p>
             <a:pPr rtl="0"/>
+            <a:r>
+              <a:rPr lang="pt-BR" dirty="0" smtClean="0"/>
+              <a:t>Membros do Grupo</a:t>
+            </a:r>
             <a:endParaRPr lang="pt-BR" dirty="0"/>
           </a:p>
         </p:txBody>
@@ -11200,13 +11382,263 @@
             <p:ph idx="1"/>
           </p:nvPr>
         </p:nvSpPr>
-        <p:spPr/>
+        <p:spPr>
+          <a:xfrm>
+            <a:off x="6918277" y="1981200"/>
+            <a:ext cx="4327478" cy="3439236"/>
+          </a:xfrm>
+        </p:spPr>
         <p:txBody>
           <a:bodyPr rtlCol="0"/>
           <a:lstStyle/>
           <a:p>
-            <a:pPr rtl="0"/>
+            <a:pPr algn="just" rtl="0"/>
             <a:endParaRPr lang="pt-BR" dirty="0"/>
+          </a:p>
+          <a:p>
+            <a:pPr algn="just" rtl="0"/>
+            <a:endParaRPr lang="pt-BR" dirty="0" smtClean="0"/>
+          </a:p>
+          <a:p>
+            <a:pPr algn="just" rtl="0"/>
+            <a:r>
+              <a:rPr lang="pt-BR" dirty="0" smtClean="0"/>
+              <a:t>Leticia Lago</a:t>
+            </a:r>
+          </a:p>
+          <a:p>
+            <a:pPr algn="just" rtl="0"/>
+            <a:r>
+              <a:rPr lang="pt-BR" dirty="0" smtClean="0"/>
+              <a:t>Natália Medina</a:t>
+            </a:r>
+          </a:p>
+          <a:p>
+            <a:pPr algn="just" rtl="0"/>
+            <a:r>
+              <a:rPr lang="pt-BR" dirty="0" smtClean="0"/>
+              <a:t>Vitor Leonardo</a:t>
+            </a:r>
+            <a:endParaRPr lang="pt-BR" dirty="0"/>
+          </a:p>
+        </p:txBody>
+      </p:sp>
+      <p:sp>
+        <p:nvSpPr>
+          <p:cNvPr id="4" name="Espaço reservado para conteúdo 2"/>
+          <p:cNvSpPr txBox="1">
+            <a:spLocks/>
+          </p:cNvSpPr>
+          <p:nvPr/>
+        </p:nvSpPr>
+        <p:spPr>
+          <a:xfrm>
+            <a:off x="1447800" y="1981200"/>
+            <a:ext cx="4327478" cy="3439236"/>
+          </a:xfrm>
+          <a:prstGeom prst="rect">
+            <a:avLst/>
+          </a:prstGeom>
+        </p:spPr>
+        <p:txBody>
+          <a:bodyPr vert="horz" lIns="91440" tIns="45720" rIns="91440" bIns="45720" rtlCol="0">
+            <a:normAutofit/>
+          </a:bodyPr>
+          <a:lstStyle>
+            <a:lvl1pPr marL="274320" indent="-274320" algn="l" defTabSz="914400" rtl="0" eaLnBrk="1" latinLnBrk="0" hangingPunct="1">
+              <a:lnSpc>
+                <a:spcPct val="90000"/>
+              </a:lnSpc>
+              <a:spcBef>
+                <a:spcPts val="1800"/>
+              </a:spcBef>
+              <a:buFont typeface="Arial" panose="020B0604020202020204" pitchFamily="34" charset="0"/>
+              <a:buChar char="•"/>
+              <a:defRPr sz="2400" kern="1200">
+                <a:solidFill>
+                  <a:schemeClr val="tx1"/>
+                </a:solidFill>
+                <a:latin typeface="+mn-lt"/>
+                <a:ea typeface="+mn-ea"/>
+                <a:cs typeface="+mn-cs"/>
+              </a:defRPr>
+            </a:lvl1pPr>
+            <a:lvl2pPr marL="548640" indent="-228600" algn="l" defTabSz="914400" rtl="0" eaLnBrk="1" latinLnBrk="0" hangingPunct="1">
+              <a:lnSpc>
+                <a:spcPct val="90000"/>
+              </a:lnSpc>
+              <a:spcBef>
+                <a:spcPts val="1000"/>
+              </a:spcBef>
+              <a:buFont typeface="Arial" panose="020B0604020202020204" pitchFamily="34" charset="0"/>
+              <a:buChar char="•"/>
+              <a:defRPr sz="2000" kern="1200">
+                <a:solidFill>
+                  <a:schemeClr val="tx1"/>
+                </a:solidFill>
+                <a:latin typeface="+mn-lt"/>
+                <a:ea typeface="+mn-ea"/>
+                <a:cs typeface="+mn-cs"/>
+              </a:defRPr>
+            </a:lvl2pPr>
+            <a:lvl3pPr marL="822960" indent="-228600" algn="l" defTabSz="914400" rtl="0" eaLnBrk="1" latinLnBrk="0" hangingPunct="1">
+              <a:lnSpc>
+                <a:spcPct val="90000"/>
+              </a:lnSpc>
+              <a:spcBef>
+                <a:spcPts val="800"/>
+              </a:spcBef>
+              <a:buFont typeface="Arial" panose="020B0604020202020204" pitchFamily="34" charset="0"/>
+              <a:buChar char="•"/>
+              <a:defRPr sz="1800" kern="1200">
+                <a:solidFill>
+                  <a:schemeClr val="tx1"/>
+                </a:solidFill>
+                <a:latin typeface="+mn-lt"/>
+                <a:ea typeface="+mn-ea"/>
+                <a:cs typeface="+mn-cs"/>
+              </a:defRPr>
+            </a:lvl3pPr>
+            <a:lvl4pPr marL="1097280" indent="-228600" algn="l" defTabSz="914400" rtl="0" eaLnBrk="1" latinLnBrk="0" hangingPunct="1">
+              <a:lnSpc>
+                <a:spcPct val="90000"/>
+              </a:lnSpc>
+              <a:spcBef>
+                <a:spcPts val="800"/>
+              </a:spcBef>
+              <a:buFont typeface="Arial" panose="020B0604020202020204" pitchFamily="34" charset="0"/>
+              <a:buChar char="•"/>
+              <a:defRPr sz="1600" kern="1200">
+                <a:solidFill>
+                  <a:schemeClr val="tx1"/>
+                </a:solidFill>
+                <a:latin typeface="+mn-lt"/>
+                <a:ea typeface="+mn-ea"/>
+                <a:cs typeface="+mn-cs"/>
+              </a:defRPr>
+            </a:lvl4pPr>
+            <a:lvl5pPr marL="1325880" indent="-228600" algn="l" defTabSz="914400" rtl="0" eaLnBrk="1" latinLnBrk="0" hangingPunct="1">
+              <a:lnSpc>
+                <a:spcPct val="90000"/>
+              </a:lnSpc>
+              <a:spcBef>
+                <a:spcPts val="800"/>
+              </a:spcBef>
+              <a:buFont typeface="Arial" panose="020B0604020202020204" pitchFamily="34" charset="0"/>
+              <a:buChar char="•"/>
+              <a:defRPr sz="1600" kern="1200">
+                <a:solidFill>
+                  <a:schemeClr val="tx1"/>
+                </a:solidFill>
+                <a:latin typeface="+mn-lt"/>
+                <a:ea typeface="+mn-ea"/>
+                <a:cs typeface="+mn-cs"/>
+              </a:defRPr>
+            </a:lvl5pPr>
+            <a:lvl6pPr marL="1554480" indent="-228600" algn="l" defTabSz="914400" rtl="0" eaLnBrk="1" latinLnBrk="0" hangingPunct="1">
+              <a:lnSpc>
+                <a:spcPct val="90000"/>
+              </a:lnSpc>
+              <a:spcBef>
+                <a:spcPts val="800"/>
+              </a:spcBef>
+              <a:buFont typeface="Arial" panose="020B0604020202020204" pitchFamily="34" charset="0"/>
+              <a:buChar char="•"/>
+              <a:defRPr sz="1600" kern="1200">
+                <a:solidFill>
+                  <a:schemeClr val="tx1"/>
+                </a:solidFill>
+                <a:latin typeface="+mn-lt"/>
+                <a:ea typeface="+mn-ea"/>
+                <a:cs typeface="+mn-cs"/>
+              </a:defRPr>
+            </a:lvl6pPr>
+            <a:lvl7pPr marL="1783080" indent="-228600" algn="l" defTabSz="914400" rtl="0" eaLnBrk="1" latinLnBrk="0" hangingPunct="1">
+              <a:lnSpc>
+                <a:spcPct val="90000"/>
+              </a:lnSpc>
+              <a:spcBef>
+                <a:spcPts val="800"/>
+              </a:spcBef>
+              <a:buFont typeface="Arial" panose="020B0604020202020204" pitchFamily="34" charset="0"/>
+              <a:buChar char="•"/>
+              <a:defRPr sz="1600" kern="1200">
+                <a:solidFill>
+                  <a:schemeClr val="tx1"/>
+                </a:solidFill>
+                <a:latin typeface="+mn-lt"/>
+                <a:ea typeface="+mn-ea"/>
+                <a:cs typeface="+mn-cs"/>
+              </a:defRPr>
+            </a:lvl7pPr>
+            <a:lvl8pPr marL="2011680" indent="-228600" algn="l" defTabSz="914400" rtl="0" eaLnBrk="1" latinLnBrk="0" hangingPunct="1">
+              <a:lnSpc>
+                <a:spcPct val="90000"/>
+              </a:lnSpc>
+              <a:spcBef>
+                <a:spcPts val="800"/>
+              </a:spcBef>
+              <a:buFont typeface="Arial" panose="020B0604020202020204" pitchFamily="34" charset="0"/>
+              <a:buChar char="•"/>
+              <a:defRPr sz="1600" kern="1200">
+                <a:solidFill>
+                  <a:schemeClr val="tx1"/>
+                </a:solidFill>
+                <a:latin typeface="+mn-lt"/>
+                <a:ea typeface="+mn-ea"/>
+                <a:cs typeface="+mn-cs"/>
+              </a:defRPr>
+            </a:lvl8pPr>
+            <a:lvl9pPr marL="2240280" indent="-228600" algn="l" defTabSz="914400" rtl="0" eaLnBrk="1" latinLnBrk="0" hangingPunct="1">
+              <a:lnSpc>
+                <a:spcPct val="90000"/>
+              </a:lnSpc>
+              <a:spcBef>
+                <a:spcPts val="800"/>
+              </a:spcBef>
+              <a:buFont typeface="Arial" panose="020B0604020202020204" pitchFamily="34" charset="0"/>
+              <a:buChar char="•"/>
+              <a:defRPr sz="1600" kern="1200">
+                <a:solidFill>
+                  <a:schemeClr val="tx1"/>
+                </a:solidFill>
+                <a:latin typeface="+mn-lt"/>
+                <a:ea typeface="+mn-ea"/>
+                <a:cs typeface="+mn-cs"/>
+              </a:defRPr>
+            </a:lvl9pPr>
+          </a:lstStyle>
+          <a:p>
+            <a:endParaRPr lang="pt-BR" dirty="0" smtClean="0"/>
+          </a:p>
+          <a:p>
+            <a:endParaRPr lang="pt-BR" dirty="0" smtClean="0"/>
+          </a:p>
+          <a:p>
+            <a:r>
+              <a:rPr lang="pt-BR" dirty="0" smtClean="0"/>
+              <a:t>Adriana </a:t>
+            </a:r>
+            <a:r>
+              <a:rPr lang="pt-BR" dirty="0" err="1" smtClean="0"/>
+              <a:t>Elva</a:t>
+            </a:r>
+            <a:r>
+              <a:rPr lang="pt-BR" dirty="0" smtClean="0"/>
+              <a:t> </a:t>
+            </a:r>
+          </a:p>
+          <a:p>
+            <a:r>
+              <a:rPr lang="pt-BR" dirty="0" smtClean="0"/>
+              <a:t>Fernanda Esteves</a:t>
+            </a:r>
+          </a:p>
+          <a:p>
+            <a:r>
+              <a:rPr lang="pt-BR" dirty="0" smtClean="0"/>
+              <a:t>Gustavo Henrique</a:t>
+            </a:r>
           </a:p>
         </p:txBody>
       </p:sp>
@@ -11269,37 +11701,35 @@
           <a:p>
             <a:pPr rtl="0"/>
             <a:r>
-              <a:rPr lang="pt-BR" dirty="0"/>
-              <a:t>Título e layout de conteúdo com gráfico</a:t>
+              <a:rPr lang="pt-BR" dirty="0" smtClean="0"/>
+              <a:t>O Projeto</a:t>
             </a:r>
-          </a:p>
-        </p:txBody>
-      </p:sp>
-      <p:graphicFrame>
-        <p:nvGraphicFramePr>
-          <p:cNvPr id="6" name="Espaço reservado para conteúdo 5" descr="Gráfico de colunas clusterizado representando&#10;Gráfico de combinação de três séries para quatro categorias"/>
-          <p:cNvGraphicFramePr>
-            <a:graphicFrameLocks noGrp="1"/>
-          </p:cNvGraphicFramePr>
+            <a:endParaRPr lang="pt-BR" dirty="0"/>
+          </a:p>
+        </p:txBody>
+      </p:sp>
+      <p:sp>
+        <p:nvSpPr>
+          <p:cNvPr id="3" name="Espaço Reservado para Conteúdo 2"/>
+          <p:cNvSpPr>
+            <a:spLocks noGrp="1"/>
+          </p:cNvSpPr>
           <p:nvPr>
             <p:ph idx="1"/>
-            <p:extLst>
-              <p:ext uri="{D42A27DB-BD31-4B8C-83A1-F6EECF244321}">
-                <p14:modId xmlns:p14="http://schemas.microsoft.com/office/powerpoint/2010/main" val="3788173342"/>
-              </p:ext>
-            </p:extLst>
-          </p:nvPr>
-        </p:nvGraphicFramePr>
-        <p:xfrm>
-          <a:off x="1295400" y="1828800"/>
-          <a:ext cx="9601200" cy="4343400"/>
-        </p:xfrm>
-        <a:graphic>
-          <a:graphicData uri="http://schemas.openxmlformats.org/drawingml/2006/chart">
-            <c:chart xmlns:c="http://schemas.openxmlformats.org/drawingml/2006/chart" xmlns:r="http://schemas.openxmlformats.org/officeDocument/2006/relationships" r:id="rId3"/>
-          </a:graphicData>
-        </a:graphic>
-      </p:graphicFrame>
+          </p:nvPr>
+        </p:nvSpPr>
+        <p:spPr/>
+        <p:txBody>
+          <a:bodyPr/>
+          <a:lstStyle/>
+          <a:p>
+            <a:pPr marL="0" indent="0">
+              <a:buNone/>
+            </a:pPr>
+            <a:endParaRPr lang="pt-BR" dirty="0"/>
+          </a:p>
+        </p:txBody>
+      </p:sp>
     </p:spTree>
     <p:extLst>
       <p:ext uri="{BB962C8B-B14F-4D97-AF65-F5344CB8AC3E}">
@@ -11326,6 +11756,96 @@
 </file>
 
 <file path=ppt/slides/slide4.xml><?xml version="1.0" encoding="utf-8"?>
+<p:sld xmlns:a="http://schemas.openxmlformats.org/drawingml/2006/main" xmlns:r="http://schemas.openxmlformats.org/officeDocument/2006/relationships" xmlns:p="http://schemas.openxmlformats.org/presentationml/2006/main">
+  <p:cSld>
+    <p:spTree>
+      <p:nvGrpSpPr>
+        <p:cNvPr id="1" name=""/>
+        <p:cNvGrpSpPr/>
+        <p:nvPr/>
+      </p:nvGrpSpPr>
+      <p:grpSpPr>
+        <a:xfrm>
+          <a:off x="0" y="0"/>
+          <a:ext cx="0" cy="0"/>
+          <a:chOff x="0" y="0"/>
+          <a:chExt cx="0" cy="0"/>
+        </a:xfrm>
+      </p:grpSpPr>
+      <p:sp>
+        <p:nvSpPr>
+          <p:cNvPr id="2" name="Título 1"/>
+          <p:cNvSpPr>
+            <a:spLocks noGrp="1"/>
+          </p:cNvSpPr>
+          <p:nvPr>
+            <p:ph type="title"/>
+          </p:nvPr>
+        </p:nvSpPr>
+        <p:spPr/>
+        <p:txBody>
+          <a:bodyPr rtlCol="0"/>
+          <a:lstStyle/>
+          <a:p>
+            <a:pPr rtl="0"/>
+            <a:r>
+              <a:rPr lang="pt-BR" dirty="0"/>
+              <a:t>Título e layout de conteúdo com gráfico</a:t>
+            </a:r>
+          </a:p>
+        </p:txBody>
+      </p:sp>
+      <p:graphicFrame>
+        <p:nvGraphicFramePr>
+          <p:cNvPr id="6" name="Espaço reservado para conteúdo 5" descr="Gráfico de colunas clusterizado representando&#10;Gráfico de combinação de três séries para quatro categorias"/>
+          <p:cNvGraphicFramePr>
+            <a:graphicFrameLocks noGrp="1"/>
+          </p:cNvGraphicFramePr>
+          <p:nvPr>
+            <p:ph idx="1"/>
+            <p:extLst>
+              <p:ext uri="{D42A27DB-BD31-4B8C-83A1-F6EECF244321}">
+                <p14:modId xmlns:p14="http://schemas.microsoft.com/office/powerpoint/2010/main" val="3788173342"/>
+              </p:ext>
+            </p:extLst>
+          </p:nvPr>
+        </p:nvGraphicFramePr>
+        <p:xfrm>
+          <a:off x="1295400" y="1828800"/>
+          <a:ext cx="9601200" cy="4343400"/>
+        </p:xfrm>
+        <a:graphic>
+          <a:graphicData uri="http://schemas.openxmlformats.org/drawingml/2006/chart">
+            <c:chart xmlns:c="http://schemas.openxmlformats.org/drawingml/2006/chart" xmlns:r="http://schemas.openxmlformats.org/officeDocument/2006/relationships" r:id="rId3"/>
+          </a:graphicData>
+        </a:graphic>
+      </p:graphicFrame>
+    </p:spTree>
+    <p:extLst>
+      <p:ext uri="{BB962C8B-B14F-4D97-AF65-F5344CB8AC3E}">
+        <p14:creationId xmlns:p14="http://schemas.microsoft.com/office/powerpoint/2010/main" val="1179164655"/>
+      </p:ext>
+    </p:extLst>
+  </p:cSld>
+  <p:clrMapOvr>
+    <a:masterClrMapping/>
+  </p:clrMapOvr>
+  <mc:AlternateContent xmlns:mc="http://schemas.openxmlformats.org/markup-compatibility/2006" xmlns:p14="http://schemas.microsoft.com/office/powerpoint/2010/main">
+    <mc:Choice Requires="p14">
+      <p:transition spd="med" p14:dur="700">
+        <p:fade/>
+      </p:transition>
+    </mc:Choice>
+    <mc:Fallback xmlns="">
+      <p:transition spd="med">
+        <p:fade/>
+      </p:transition>
+    </mc:Fallback>
+  </mc:AlternateContent>
+</p:sld>
+</file>
+
+<file path=ppt/slides/slide5.xml><?xml version="1.0" encoding="utf-8"?>
 <p:sld xmlns:a="http://schemas.openxmlformats.org/drawingml/2006/main" xmlns:r="http://schemas.openxmlformats.org/officeDocument/2006/relationships" xmlns:p="http://schemas.openxmlformats.org/presentationml/2006/main">
   <p:cSld>
     <p:spTree>
@@ -11675,101 +12195,6 @@
 </p:sld>
 </file>
 
-<file path=ppt/slides/slide5.xml><?xml version="1.0" encoding="utf-8"?>
-<p:sld xmlns:a="http://schemas.openxmlformats.org/drawingml/2006/main" xmlns:r="http://schemas.openxmlformats.org/officeDocument/2006/relationships" xmlns:p="http://schemas.openxmlformats.org/presentationml/2006/main">
-  <p:cSld>
-    <p:spTree>
-      <p:nvGrpSpPr>
-        <p:cNvPr id="1" name=""/>
-        <p:cNvGrpSpPr/>
-        <p:nvPr/>
-      </p:nvGrpSpPr>
-      <p:grpSpPr>
-        <a:xfrm>
-          <a:off x="0" y="0"/>
-          <a:ext cx="0" cy="0"/>
-          <a:chOff x="0" y="0"/>
-          <a:chExt cx="0" cy="0"/>
-        </a:xfrm>
-      </p:grpSpPr>
-      <p:sp>
-        <p:nvSpPr>
-          <p:cNvPr id="2" name="Título 1"/>
-          <p:cNvSpPr>
-            <a:spLocks noGrp="1"/>
-          </p:cNvSpPr>
-          <p:nvPr>
-            <p:ph type="title"/>
-          </p:nvPr>
-        </p:nvSpPr>
-        <p:spPr/>
-        <p:txBody>
-          <a:bodyPr rtlCol="0"/>
-          <a:lstStyle/>
-          <a:p>
-            <a:pPr rtl="0"/>
-            <a:r>
-              <a:rPr lang="pt-BR" dirty="0"/>
-              <a:t>Título e layout de conteúdo com </a:t>
-            </a:r>
-            <a:r>
-              <a:rPr lang="pt-BR" dirty="0" err="1"/>
-              <a:t>SmartArt</a:t>
-            </a:r>
-            <a:endParaRPr lang="pt-BR" dirty="0"/>
-          </a:p>
-        </p:txBody>
-      </p:sp>
-      <p:graphicFrame>
-        <p:nvGraphicFramePr>
-          <p:cNvPr id="6" name="Espaço reservado para conteúdo 5" descr="Diagrama de Processo com divisa básico mostrando 4 etapas organizadas da esquerda para a direita"/>
-          <p:cNvGraphicFramePr>
-            <a:graphicFrameLocks noGrp="1"/>
-          </p:cNvGraphicFramePr>
-          <p:nvPr>
-            <p:ph idx="1"/>
-            <p:extLst>
-              <p:ext uri="{D42A27DB-BD31-4B8C-83A1-F6EECF244321}">
-                <p14:modId xmlns:p14="http://schemas.microsoft.com/office/powerpoint/2010/main" val="828014975"/>
-              </p:ext>
-            </p:extLst>
-          </p:nvPr>
-        </p:nvGraphicFramePr>
-        <p:xfrm>
-          <a:off x="1295400" y="1828800"/>
-          <a:ext cx="9601200" cy="4343400"/>
-        </p:xfrm>
-        <a:graphic>
-          <a:graphicData uri="http://schemas.openxmlformats.org/drawingml/2006/diagram">
-            <dgm:relIds xmlns:dgm="http://schemas.openxmlformats.org/drawingml/2006/diagram" xmlns:r="http://schemas.openxmlformats.org/officeDocument/2006/relationships" r:dm="rId3" r:lo="rId4" r:qs="rId5" r:cs="rId6"/>
-          </a:graphicData>
-        </a:graphic>
-      </p:graphicFrame>
-    </p:spTree>
-    <p:extLst>
-      <p:ext uri="{BB962C8B-B14F-4D97-AF65-F5344CB8AC3E}">
-        <p14:creationId xmlns:p14="http://schemas.microsoft.com/office/powerpoint/2010/main" val="3112142608"/>
-      </p:ext>
-    </p:extLst>
-  </p:cSld>
-  <p:clrMapOvr>
-    <a:masterClrMapping/>
-  </p:clrMapOvr>
-  <mc:AlternateContent xmlns:mc="http://schemas.openxmlformats.org/markup-compatibility/2006" xmlns:p14="http://schemas.microsoft.com/office/powerpoint/2010/main">
-    <mc:Choice Requires="p14">
-      <p:transition spd="med" p14:dur="700">
-        <p:fade/>
-      </p:transition>
-    </mc:Choice>
-    <mc:Fallback xmlns="">
-      <p:transition spd="med">
-        <p:fade/>
-      </p:transition>
-    </mc:Fallback>
-  </mc:AlternateContent>
-</p:sld>
-</file>
-
 <file path=ppt/slides/slide6.xml><?xml version="1.0" encoding="utf-8"?>
 <p:sld xmlns:a="http://schemas.openxmlformats.org/drawingml/2006/main" xmlns:r="http://schemas.openxmlformats.org/officeDocument/2006/relationships" xmlns:p="http://schemas.openxmlformats.org/presentationml/2006/main">
   <p:cSld>
@@ -11794,7 +12219,7 @@
             <a:spLocks noGrp="1"/>
           </p:cNvSpPr>
           <p:nvPr>
-            <p:ph type="ctrTitle"/>
+            <p:ph type="title"/>
           </p:nvPr>
         </p:nvSpPr>
         <p:spPr/>
@@ -11804,36 +12229,46 @@
           <a:p>
             <a:pPr rtl="0"/>
             <a:r>
-              <a:rPr lang="pt-BR" spc="-90" dirty="0"/>
-              <a:t>Adicionar título de slide – 1</a:t>
+              <a:rPr lang="pt-BR" dirty="0"/>
+              <a:t>Título e layout de conteúdo com </a:t>
             </a:r>
-          </a:p>
-        </p:txBody>
-      </p:sp>
-      <p:sp>
-        <p:nvSpPr>
-          <p:cNvPr id="4" name="Subtítulo 3"/>
-          <p:cNvSpPr>
-            <a:spLocks noGrp="1"/>
-          </p:cNvSpPr>
-          <p:nvPr>
-            <p:ph type="subTitle" idx="1"/>
-          </p:nvPr>
-        </p:nvSpPr>
-        <p:spPr/>
-        <p:txBody>
-          <a:bodyPr rtlCol="0"/>
-          <a:lstStyle/>
-          <a:p>
-            <a:pPr rtl="0"/>
+            <a:r>
+              <a:rPr lang="pt-BR" dirty="0" err="1"/>
+              <a:t>SmartArt</a:t>
+            </a:r>
             <a:endParaRPr lang="pt-BR" dirty="0"/>
           </a:p>
         </p:txBody>
       </p:sp>
+      <p:graphicFrame>
+        <p:nvGraphicFramePr>
+          <p:cNvPr id="6" name="Espaço reservado para conteúdo 5" descr="Diagrama de Processo com divisa básico mostrando 4 etapas organizadas da esquerda para a direita"/>
+          <p:cNvGraphicFramePr>
+            <a:graphicFrameLocks noGrp="1"/>
+          </p:cNvGraphicFramePr>
+          <p:nvPr>
+            <p:ph idx="1"/>
+            <p:extLst>
+              <p:ext uri="{D42A27DB-BD31-4B8C-83A1-F6EECF244321}">
+                <p14:modId xmlns:p14="http://schemas.microsoft.com/office/powerpoint/2010/main" val="828014975"/>
+              </p:ext>
+            </p:extLst>
+          </p:nvPr>
+        </p:nvGraphicFramePr>
+        <p:xfrm>
+          <a:off x="1295400" y="1828800"/>
+          <a:ext cx="9601200" cy="4343400"/>
+        </p:xfrm>
+        <a:graphic>
+          <a:graphicData uri="http://schemas.openxmlformats.org/drawingml/2006/diagram">
+            <dgm:relIds xmlns:dgm="http://schemas.openxmlformats.org/drawingml/2006/diagram" xmlns:r="http://schemas.openxmlformats.org/officeDocument/2006/relationships" r:dm="rId3" r:lo="rId4" r:qs="rId5" r:cs="rId6"/>
+          </a:graphicData>
+        </a:graphic>
+      </p:graphicFrame>
     </p:spTree>
     <p:extLst>
       <p:ext uri="{BB962C8B-B14F-4D97-AF65-F5344CB8AC3E}">
-        <p14:creationId xmlns:p14="http://schemas.microsoft.com/office/powerpoint/2010/main" val="1636679273"/>
+        <p14:creationId xmlns:p14="http://schemas.microsoft.com/office/powerpoint/2010/main" val="3112142608"/>
       </p:ext>
     </p:extLst>
   </p:cSld>
@@ -11879,7 +12314,7 @@
             <a:spLocks noGrp="1"/>
           </p:cNvSpPr>
           <p:nvPr>
-            <p:ph type="title"/>
+            <p:ph type="ctrTitle"/>
           </p:nvPr>
         </p:nvSpPr>
         <p:spPr/>
@@ -11889,20 +12324,20 @@
           <a:p>
             <a:pPr rtl="0"/>
             <a:r>
-              <a:rPr lang="pt-BR" dirty="0"/>
-              <a:t>Adicionar título de slide – 2</a:t>
+              <a:rPr lang="pt-BR" spc="-90" dirty="0"/>
+              <a:t>Adicionar título de slide – 1</a:t>
             </a:r>
           </a:p>
         </p:txBody>
       </p:sp>
       <p:sp>
         <p:nvSpPr>
-          <p:cNvPr id="4" name="Espaço reservado para texto 3"/>
-          <p:cNvSpPr>
-            <a:spLocks noGrp="1"/>
-          </p:cNvSpPr>
-          <p:nvPr>
-            <p:ph type="body" idx="1"/>
+          <p:cNvPr id="4" name="Subtítulo 3"/>
+          <p:cNvSpPr>
+            <a:spLocks noGrp="1"/>
+          </p:cNvSpPr>
+          <p:nvPr>
+            <p:ph type="subTitle" idx="1"/>
           </p:nvPr>
         </p:nvSpPr>
         <p:spPr/>
@@ -11918,7 +12353,7 @@
     </p:spTree>
     <p:extLst>
       <p:ext uri="{BB962C8B-B14F-4D97-AF65-F5344CB8AC3E}">
-        <p14:creationId xmlns:p14="http://schemas.microsoft.com/office/powerpoint/2010/main" val="3374778722"/>
+        <p14:creationId xmlns:p14="http://schemas.microsoft.com/office/powerpoint/2010/main" val="1636679273"/>
       </p:ext>
     </p:extLst>
   </p:cSld>
@@ -11975,79 +12410,19 @@
             <a:pPr rtl="0"/>
             <a:r>
               <a:rPr lang="pt-BR" dirty="0"/>
-              <a:t>Adicionar título de slide – 3</a:t>
+              <a:t>Adicionar título de slide – 2</a:t>
             </a:r>
           </a:p>
         </p:txBody>
       </p:sp>
       <p:sp>
         <p:nvSpPr>
-          <p:cNvPr id="11" name="Espaço reservado para texto 10"/>
+          <p:cNvPr id="4" name="Espaço reservado para texto 3"/>
           <p:cNvSpPr>
             <a:spLocks noGrp="1"/>
           </p:cNvSpPr>
           <p:nvPr>
             <p:ph type="body" idx="1"/>
-          </p:nvPr>
-        </p:nvSpPr>
-        <p:spPr/>
-        <p:txBody>
-          <a:bodyPr rtlCol="0"/>
-          <a:lstStyle/>
-          <a:p>
-            <a:pPr rtl="0"/>
-            <a:endParaRPr lang="pt-BR" dirty="0"/>
-          </a:p>
-        </p:txBody>
-      </p:sp>
-      <p:sp>
-        <p:nvSpPr>
-          <p:cNvPr id="12" name="Espaço reservado para conteúdo 11"/>
-          <p:cNvSpPr>
-            <a:spLocks noGrp="1"/>
-          </p:cNvSpPr>
-          <p:nvPr>
-            <p:ph sz="half" idx="2"/>
-          </p:nvPr>
-        </p:nvSpPr>
-        <p:spPr/>
-        <p:txBody>
-          <a:bodyPr rtlCol="0"/>
-          <a:lstStyle/>
-          <a:p>
-            <a:pPr rtl="0"/>
-            <a:endParaRPr lang="pt-BR" dirty="0"/>
-          </a:p>
-        </p:txBody>
-      </p:sp>
-      <p:sp>
-        <p:nvSpPr>
-          <p:cNvPr id="13" name="Espaço reservado para texto 12"/>
-          <p:cNvSpPr>
-            <a:spLocks noGrp="1"/>
-          </p:cNvSpPr>
-          <p:nvPr>
-            <p:ph type="body" sz="quarter" idx="3"/>
-          </p:nvPr>
-        </p:nvSpPr>
-        <p:spPr/>
-        <p:txBody>
-          <a:bodyPr rtlCol="0"/>
-          <a:lstStyle/>
-          <a:p>
-            <a:pPr rtl="0"/>
-            <a:endParaRPr lang="pt-BR" dirty="0"/>
-          </a:p>
-        </p:txBody>
-      </p:sp>
-      <p:sp>
-        <p:nvSpPr>
-          <p:cNvPr id="14" name="Espaço reservado para conteúdo 13"/>
-          <p:cNvSpPr>
-            <a:spLocks noGrp="1"/>
-          </p:cNvSpPr>
-          <p:nvPr>
-            <p:ph sz="quarter" idx="4"/>
           </p:nvPr>
         </p:nvSpPr>
         <p:spPr/>
@@ -12063,7 +12438,7 @@
     </p:spTree>
     <p:extLst>
       <p:ext uri="{BB962C8B-B14F-4D97-AF65-F5344CB8AC3E}">
-        <p14:creationId xmlns:p14="http://schemas.microsoft.com/office/powerpoint/2010/main" val="737118897"/>
+        <p14:creationId xmlns:p14="http://schemas.microsoft.com/office/powerpoint/2010/main" val="3374778722"/>
       </p:ext>
     </p:extLst>
   </p:cSld>
@@ -12120,15 +12495,95 @@
             <a:pPr rtl="0"/>
             <a:r>
               <a:rPr lang="pt-BR" dirty="0"/>
-              <a:t>Adicionar título de slide – 4</a:t>
+              <a:t>Adicionar título de slide – 3</a:t>
             </a:r>
+          </a:p>
+        </p:txBody>
+      </p:sp>
+      <p:sp>
+        <p:nvSpPr>
+          <p:cNvPr id="11" name="Espaço reservado para texto 10"/>
+          <p:cNvSpPr>
+            <a:spLocks noGrp="1"/>
+          </p:cNvSpPr>
+          <p:nvPr>
+            <p:ph type="body" idx="1"/>
+          </p:nvPr>
+        </p:nvSpPr>
+        <p:spPr/>
+        <p:txBody>
+          <a:bodyPr rtlCol="0"/>
+          <a:lstStyle/>
+          <a:p>
+            <a:pPr rtl="0"/>
+            <a:endParaRPr lang="pt-BR" dirty="0"/>
+          </a:p>
+        </p:txBody>
+      </p:sp>
+      <p:sp>
+        <p:nvSpPr>
+          <p:cNvPr id="12" name="Espaço reservado para conteúdo 11"/>
+          <p:cNvSpPr>
+            <a:spLocks noGrp="1"/>
+          </p:cNvSpPr>
+          <p:nvPr>
+            <p:ph sz="half" idx="2"/>
+          </p:nvPr>
+        </p:nvSpPr>
+        <p:spPr/>
+        <p:txBody>
+          <a:bodyPr rtlCol="0"/>
+          <a:lstStyle/>
+          <a:p>
+            <a:pPr rtl="0"/>
+            <a:endParaRPr lang="pt-BR" dirty="0"/>
+          </a:p>
+        </p:txBody>
+      </p:sp>
+      <p:sp>
+        <p:nvSpPr>
+          <p:cNvPr id="13" name="Espaço reservado para texto 12"/>
+          <p:cNvSpPr>
+            <a:spLocks noGrp="1"/>
+          </p:cNvSpPr>
+          <p:nvPr>
+            <p:ph type="body" sz="quarter" idx="3"/>
+          </p:nvPr>
+        </p:nvSpPr>
+        <p:spPr/>
+        <p:txBody>
+          <a:bodyPr rtlCol="0"/>
+          <a:lstStyle/>
+          <a:p>
+            <a:pPr rtl="0"/>
+            <a:endParaRPr lang="pt-BR" dirty="0"/>
+          </a:p>
+        </p:txBody>
+      </p:sp>
+      <p:sp>
+        <p:nvSpPr>
+          <p:cNvPr id="14" name="Espaço reservado para conteúdo 13"/>
+          <p:cNvSpPr>
+            <a:spLocks noGrp="1"/>
+          </p:cNvSpPr>
+          <p:nvPr>
+            <p:ph sz="quarter" idx="4"/>
+          </p:nvPr>
+        </p:nvSpPr>
+        <p:spPr/>
+        <p:txBody>
+          <a:bodyPr rtlCol="0"/>
+          <a:lstStyle/>
+          <a:p>
+            <a:pPr rtl="0"/>
+            <a:endParaRPr lang="pt-BR" dirty="0"/>
           </a:p>
         </p:txBody>
       </p:sp>
     </p:spTree>
     <p:extLst>
       <p:ext uri="{BB962C8B-B14F-4D97-AF65-F5344CB8AC3E}">
-        <p14:creationId xmlns:p14="http://schemas.microsoft.com/office/powerpoint/2010/main" val="3061729273"/>
+        <p14:creationId xmlns:p14="http://schemas.microsoft.com/office/powerpoint/2010/main" val="737118897"/>
       </p:ext>
     </p:extLst>
   </p:cSld>

</xml_diff>

<commit_message>
Atualizacao DER PPT - @virtohoho
</commit_message>
<xml_diff>
--- a/documentacao/PowerPoint.pptx
+++ b/documentacao/PowerPoint.pptx
@@ -339,7 +339,9 @@
               <c:showPercent val="0"/>
               <c:showBubbleSize val="0"/>
               <c:extLst>
-                <c:ext xmlns:c15="http://schemas.microsoft.com/office/drawing/2012/chart" uri="{CE6537A1-D6FC-4f65-9D91-7224C49458BB}"/>
+                <c:ext xmlns:c15="http://schemas.microsoft.com/office/drawing/2012/chart" uri="{CE6537A1-D6FC-4f65-9D91-7224C49458BB}">
+                  <c15:layout/>
+                </c:ext>
                 <c:ext xmlns:c16="http://schemas.microsoft.com/office/drawing/2014/chart" uri="{C3380CC4-5D6E-409C-BE32-E72D297353CC}">
                   <c16:uniqueId val="{00000003-749E-4529-A1A6-5419C5DD7C65}"/>
                 </c:ext>
@@ -360,7 +362,9 @@
               <c:showPercent val="0"/>
               <c:showBubbleSize val="0"/>
               <c:extLst>
-                <c:ext xmlns:c15="http://schemas.microsoft.com/office/drawing/2012/chart" uri="{CE6537A1-D6FC-4f65-9D91-7224C49458BB}"/>
+                <c:ext xmlns:c15="http://schemas.microsoft.com/office/drawing/2012/chart" uri="{CE6537A1-D6FC-4f65-9D91-7224C49458BB}">
+                  <c15:layout/>
+                </c:ext>
                 <c:ext xmlns:c16="http://schemas.microsoft.com/office/drawing/2014/chart" uri="{C3380CC4-5D6E-409C-BE32-E72D297353CC}">
                   <c16:uniqueId val="{00000005-749E-4529-A1A6-5419C5DD7C65}"/>
                 </c:ext>
@@ -381,7 +385,9 @@
               <c:showPercent val="0"/>
               <c:showBubbleSize val="0"/>
               <c:extLst>
-                <c:ext xmlns:c15="http://schemas.microsoft.com/office/drawing/2012/chart" uri="{CE6537A1-D6FC-4f65-9D91-7224C49458BB}"/>
+                <c:ext xmlns:c15="http://schemas.microsoft.com/office/drawing/2012/chart" uri="{CE6537A1-D6FC-4f65-9D91-7224C49458BB}">
+                  <c15:layout/>
+                </c:ext>
                 <c:ext xmlns:c16="http://schemas.microsoft.com/office/drawing/2014/chart" uri="{C3380CC4-5D6E-409C-BE32-E72D297353CC}">
                   <c16:uniqueId val="{0000000C-0D5B-4790-9681-FF0CECD76294}"/>
                 </c:ext>
@@ -402,7 +408,9 @@
               <c:showPercent val="0"/>
               <c:showBubbleSize val="0"/>
               <c:extLst>
-                <c:ext xmlns:c15="http://schemas.microsoft.com/office/drawing/2012/chart" uri="{CE6537A1-D6FC-4f65-9D91-7224C49458BB}"/>
+                <c:ext xmlns:c15="http://schemas.microsoft.com/office/drawing/2012/chart" uri="{CE6537A1-D6FC-4f65-9D91-7224C49458BB}">
+                  <c15:layout/>
+                </c:ext>
                 <c:ext xmlns:c16="http://schemas.microsoft.com/office/drawing/2014/chart" uri="{C3380CC4-5D6E-409C-BE32-E72D297353CC}">
                   <c16:uniqueId val="{0000000F-0D5B-4790-9681-FF0CECD76294}"/>
                 </c:ext>
@@ -423,7 +431,9 @@
               <c:showPercent val="0"/>
               <c:showBubbleSize val="0"/>
               <c:extLst>
-                <c:ext xmlns:c15="http://schemas.microsoft.com/office/drawing/2012/chart" uri="{CE6537A1-D6FC-4f65-9D91-7224C49458BB}"/>
+                <c:ext xmlns:c15="http://schemas.microsoft.com/office/drawing/2012/chart" uri="{CE6537A1-D6FC-4f65-9D91-7224C49458BB}">
+                  <c15:layout/>
+                </c:ext>
                 <c:ext xmlns:c16="http://schemas.microsoft.com/office/drawing/2014/chart" uri="{C3380CC4-5D6E-409C-BE32-E72D297353CC}">
                   <c16:uniqueId val="{0000000D-0D5B-4790-9681-FF0CECD76294}"/>
                 </c:ext>
@@ -444,7 +454,9 @@
               <c:showPercent val="0"/>
               <c:showBubbleSize val="0"/>
               <c:extLst>
-                <c:ext xmlns:c15="http://schemas.microsoft.com/office/drawing/2012/chart" uri="{CE6537A1-D6FC-4f65-9D91-7224C49458BB}"/>
+                <c:ext xmlns:c15="http://schemas.microsoft.com/office/drawing/2012/chart" uri="{CE6537A1-D6FC-4f65-9D91-7224C49458BB}">
+                  <c15:layout/>
+                </c:ext>
                 <c:ext xmlns:c16="http://schemas.microsoft.com/office/drawing/2014/chart" uri="{C3380CC4-5D6E-409C-BE32-E72D297353CC}">
                   <c16:uniqueId val="{0000000E-0D5B-4790-9681-FF0CECD76294}"/>
                 </c:ext>
@@ -483,6 +495,7 @@
             <c:showLeaderLines val="0"/>
             <c:extLst>
               <c:ext xmlns:c15="http://schemas.microsoft.com/office/drawing/2012/chart" uri="{CE6537A1-D6FC-4f65-9D91-7224C49458BB}">
+                <c15:layout/>
                 <c15:showLeaderLines val="1"/>
                 <c15:leaderLines>
                   <c:spPr>
@@ -723,7 +736,9 @@
               <c:showPercent val="0"/>
               <c:showBubbleSize val="0"/>
               <c:extLst>
-                <c:ext xmlns:c15="http://schemas.microsoft.com/office/drawing/2012/chart" uri="{CE6537A1-D6FC-4f65-9D91-7224C49458BB}"/>
+                <c:ext xmlns:c15="http://schemas.microsoft.com/office/drawing/2012/chart" uri="{CE6537A1-D6FC-4f65-9D91-7224C49458BB}">
+                  <c15:layout/>
+                </c:ext>
                 <c:ext xmlns:c16="http://schemas.microsoft.com/office/drawing/2014/chart" uri="{C3380CC4-5D6E-409C-BE32-E72D297353CC}">
                   <c16:uniqueId val="{0000000B-749E-4529-A1A6-5419C5DD7C65}"/>
                 </c:ext>
@@ -744,7 +759,9 @@
               <c:showPercent val="0"/>
               <c:showBubbleSize val="0"/>
               <c:extLst>
-                <c:ext xmlns:c15="http://schemas.microsoft.com/office/drawing/2012/chart" uri="{CE6537A1-D6FC-4f65-9D91-7224C49458BB}"/>
+                <c:ext xmlns:c15="http://schemas.microsoft.com/office/drawing/2012/chart" uri="{CE6537A1-D6FC-4f65-9D91-7224C49458BB}">
+                  <c15:layout/>
+                </c:ext>
                 <c:ext xmlns:c16="http://schemas.microsoft.com/office/drawing/2014/chart" uri="{C3380CC4-5D6E-409C-BE32-E72D297353CC}">
                   <c16:uniqueId val="{0000000D-749E-4529-A1A6-5419C5DD7C65}"/>
                 </c:ext>
@@ -765,7 +782,9 @@
               <c:showPercent val="0"/>
               <c:showBubbleSize val="0"/>
               <c:extLst>
-                <c:ext xmlns:c15="http://schemas.microsoft.com/office/drawing/2012/chart" uri="{CE6537A1-D6FC-4f65-9D91-7224C49458BB}"/>
+                <c:ext xmlns:c15="http://schemas.microsoft.com/office/drawing/2012/chart" uri="{CE6537A1-D6FC-4f65-9D91-7224C49458BB}">
+                  <c15:layout/>
+                </c:ext>
                 <c:ext xmlns:c16="http://schemas.microsoft.com/office/drawing/2014/chart" uri="{C3380CC4-5D6E-409C-BE32-E72D297353CC}">
                   <c16:uniqueId val="{0000000F-749E-4529-A1A6-5419C5DD7C65}"/>
                 </c:ext>
@@ -786,7 +805,9 @@
               <c:showPercent val="0"/>
               <c:showBubbleSize val="0"/>
               <c:extLst>
-                <c:ext xmlns:c15="http://schemas.microsoft.com/office/drawing/2012/chart" uri="{CE6537A1-D6FC-4f65-9D91-7224C49458BB}"/>
+                <c:ext xmlns:c15="http://schemas.microsoft.com/office/drawing/2012/chart" uri="{CE6537A1-D6FC-4f65-9D91-7224C49458BB}">
+                  <c15:layout/>
+                </c:ext>
                 <c:ext xmlns:c16="http://schemas.microsoft.com/office/drawing/2014/chart" uri="{C3380CC4-5D6E-409C-BE32-E72D297353CC}">
                   <c16:uniqueId val="{00000008-0D5B-4790-9681-FF0CECD76294}"/>
                 </c:ext>
@@ -807,7 +828,9 @@
               <c:showPercent val="0"/>
               <c:showBubbleSize val="0"/>
               <c:extLst>
-                <c:ext xmlns:c15="http://schemas.microsoft.com/office/drawing/2012/chart" uri="{CE6537A1-D6FC-4f65-9D91-7224C49458BB}"/>
+                <c:ext xmlns:c15="http://schemas.microsoft.com/office/drawing/2012/chart" uri="{CE6537A1-D6FC-4f65-9D91-7224C49458BB}">
+                  <c15:layout/>
+                </c:ext>
                 <c:ext xmlns:c16="http://schemas.microsoft.com/office/drawing/2014/chart" uri="{C3380CC4-5D6E-409C-BE32-E72D297353CC}">
                   <c16:uniqueId val="{00000009-0D5B-4790-9681-FF0CECD76294}"/>
                 </c:ext>
@@ -828,7 +851,9 @@
               <c:showPercent val="0"/>
               <c:showBubbleSize val="0"/>
               <c:extLst>
-                <c:ext xmlns:c15="http://schemas.microsoft.com/office/drawing/2012/chart" uri="{CE6537A1-D6FC-4f65-9D91-7224C49458BB}"/>
+                <c:ext xmlns:c15="http://schemas.microsoft.com/office/drawing/2012/chart" uri="{CE6537A1-D6FC-4f65-9D91-7224C49458BB}">
+                  <c15:layout/>
+                </c:ext>
                 <c:ext xmlns:c16="http://schemas.microsoft.com/office/drawing/2014/chart" uri="{C3380CC4-5D6E-409C-BE32-E72D297353CC}">
                   <c16:uniqueId val="{0000000A-0D5B-4790-9681-FF0CECD76294}"/>
                 </c:ext>
@@ -849,7 +874,9 @@
               <c:showPercent val="0"/>
               <c:showBubbleSize val="0"/>
               <c:extLst>
-                <c:ext xmlns:c15="http://schemas.microsoft.com/office/drawing/2012/chart" uri="{CE6537A1-D6FC-4f65-9D91-7224C49458BB}"/>
+                <c:ext xmlns:c15="http://schemas.microsoft.com/office/drawing/2012/chart" uri="{CE6537A1-D6FC-4f65-9D91-7224C49458BB}">
+                  <c15:layout/>
+                </c:ext>
                 <c:ext xmlns:c16="http://schemas.microsoft.com/office/drawing/2014/chart" uri="{C3380CC4-5D6E-409C-BE32-E72D297353CC}">
                   <c16:uniqueId val="{0000000B-0D5B-4790-9681-FF0CECD76294}"/>
                 </c:ext>
@@ -888,6 +915,7 @@
             <c:showLeaderLines val="0"/>
             <c:extLst>
               <c:ext xmlns:c15="http://schemas.microsoft.com/office/drawing/2012/chart" uri="{CE6537A1-D6FC-4f65-9D91-7224C49458BB}">
+                <c15:layout/>
                 <c15:showLeaderLines val="1"/>
                 <c15:leaderLines>
                   <c:spPr>
@@ -1108,6 +1136,7 @@
     </c:plotArea>
     <c:legend>
       <c:legendPos val="b"/>
+      <c:layout/>
       <c:overlay val="0"/>
       <c:spPr>
         <a:noFill/>
@@ -1801,7 +1830,7 @@
             <a:pPr rtl="0"/>
             <a:fld id="{F769B0D5-7F55-455B-B769-84B61581E250}" type="datetime1">
               <a:rPr lang="pt-BR" smtClean="0"/>
-              <a:t>10/05/2019</a:t>
+              <a:t>13/05/2019</a:t>
             </a:fld>
             <a:endParaRPr lang="pt-BR" dirty="0"/>
           </a:p>
@@ -1971,7 +2000,7 @@
             <a:pPr rtl="0"/>
             <a:fld id="{1AFE56F6-A70B-491B-A989-29E38C94819E}" type="datetime1">
               <a:rPr lang="pt-BR" noProof="0" smtClean="0"/>
-              <a:t>10/05/2019</a:t>
+              <a:t>13/05/2019</a:t>
             </a:fld>
             <a:endParaRPr lang="pt-BR" noProof="0" dirty="0"/>
           </a:p>
@@ -4410,7 +4439,7 @@
             <a:pPr rtl="0"/>
             <a:fld id="{ED540BCD-A9BE-4069-AF5C-2A3DFF693F79}" type="datetime1">
               <a:rPr lang="pt-BR" noProof="0" smtClean="0"/>
-              <a:t>10/05/2019</a:t>
+              <a:t>13/05/2019</a:t>
             </a:fld>
             <a:endParaRPr lang="pt-BR" noProof="0" dirty="0"/>
           </a:p>
@@ -5024,7 +5053,7 @@
             <a:pPr rtl="0"/>
             <a:fld id="{1CECCB52-40C2-4E99-85EA-E8A293866E2D}" type="datetime1">
               <a:rPr lang="pt-BR" noProof="0" smtClean="0"/>
-              <a:t>10/05/2019</a:t>
+              <a:t>13/05/2019</a:t>
             </a:fld>
             <a:endParaRPr lang="pt-BR" noProof="0" dirty="0"/>
           </a:p>
@@ -5213,7 +5242,7 @@
             <a:pPr rtl="0"/>
             <a:fld id="{E24EF33E-C11E-476F-ABF9-879EF9D37700}" type="datetime1">
               <a:rPr lang="pt-BR" noProof="0" smtClean="0"/>
-              <a:t>10/05/2019</a:t>
+              <a:t>13/05/2019</a:t>
             </a:fld>
             <a:endParaRPr lang="pt-BR" noProof="0" dirty="0"/>
           </a:p>
@@ -5552,7 +5581,7 @@
             <a:pPr rtl="0"/>
             <a:fld id="{AF3A9F66-FD54-49C7-9D08-483FEB75E766}" type="datetime1">
               <a:rPr lang="pt-BR" noProof="0" smtClean="0"/>
-              <a:t>10/05/2019</a:t>
+              <a:t>13/05/2019</a:t>
             </a:fld>
             <a:endParaRPr lang="pt-BR" noProof="0" dirty="0"/>
           </a:p>
@@ -5750,7 +5779,7 @@
             <a:pPr rtl="0"/>
             <a:fld id="{B76F022E-73DC-465B-A81F-663C39E9C6BC}" type="datetime1">
               <a:rPr lang="pt-BR" noProof="0" smtClean="0"/>
-              <a:t>10/05/2019</a:t>
+              <a:t>13/05/2019</a:t>
             </a:fld>
             <a:endParaRPr lang="pt-BR" noProof="0" dirty="0"/>
           </a:p>
@@ -6931,7 +6960,7 @@
             <a:pPr rtl="0"/>
             <a:fld id="{D032D7E7-0E3D-42EA-B60A-46262A5D0676}" type="datetime1">
               <a:rPr lang="pt-BR" noProof="0" smtClean="0"/>
-              <a:t>10/05/2019</a:t>
+              <a:t>13/05/2019</a:t>
             </a:fld>
             <a:endParaRPr lang="pt-BR" noProof="0" dirty="0"/>
           </a:p>
@@ -7321,7 +7350,7 @@
             <a:pPr rtl="0"/>
             <a:fld id="{A0DCB2DA-9F14-430D-AF4F-64B6EB5E00E7}" type="datetime1">
               <a:rPr lang="pt-BR" noProof="0" smtClean="0"/>
-              <a:t>10/05/2019</a:t>
+              <a:t>13/05/2019</a:t>
             </a:fld>
             <a:endParaRPr lang="pt-BR" noProof="0" dirty="0"/>
           </a:p>
@@ -7458,7 +7487,7 @@
             <a:pPr rtl="0"/>
             <a:fld id="{58A91CED-09DA-4ECE-92C8-759A4ED95185}" type="datetime1">
               <a:rPr lang="pt-BR" noProof="0" smtClean="0"/>
-              <a:t>10/05/2019</a:t>
+              <a:t>13/05/2019</a:t>
             </a:fld>
             <a:endParaRPr lang="pt-BR" noProof="0" dirty="0"/>
           </a:p>
@@ -7571,7 +7600,7 @@
             <a:pPr rtl="0"/>
             <a:fld id="{84518F8F-CA65-4BFD-A461-B66071DAF05B}" type="datetime1">
               <a:rPr lang="pt-BR" noProof="0" smtClean="0"/>
-              <a:t>10/05/2019</a:t>
+              <a:t>13/05/2019</a:t>
             </a:fld>
             <a:endParaRPr lang="pt-BR" noProof="0" dirty="0"/>
           </a:p>
@@ -7869,7 +7898,7 @@
             <a:pPr rtl="0"/>
             <a:fld id="{1FF51EBE-146A-4C5F-B6C5-AA4426FEB226}" type="datetime1">
               <a:rPr lang="pt-BR" noProof="0" smtClean="0"/>
-              <a:t>10/05/2019</a:t>
+              <a:t>13/05/2019</a:t>
             </a:fld>
             <a:endParaRPr lang="pt-BR" noProof="0" dirty="0"/>
           </a:p>
@@ -8253,7 +8282,7 @@
             <a:pPr rtl="0"/>
             <a:fld id="{AF879DE6-BF0A-412B-BA5D-89651B90F81D}" type="datetime1">
               <a:rPr lang="pt-BR" noProof="0" smtClean="0"/>
-              <a:t>10/05/2019</a:t>
+              <a:t>13/05/2019</a:t>
             </a:fld>
             <a:endParaRPr lang="pt-BR" noProof="0" dirty="0"/>
           </a:p>
@@ -10164,28 +10193,28 @@
       </p:sp>
       <p:pic>
         <p:nvPicPr>
-          <p:cNvPr id="4" name="Imagem 3">
-            <a:extLst>
-              <a:ext uri="{FF2B5EF4-FFF2-40B4-BE49-F238E27FC236}">
-                <a16:creationId xmlns:a16="http://schemas.microsoft.com/office/drawing/2014/main" id="{396D7D88-E0FB-4E78-9F4D-013AE1398AA1}"/>
-              </a:ext>
-            </a:extLst>
-          </p:cNvPr>
+          <p:cNvPr id="3" name="Imagem 2"/>
           <p:cNvPicPr>
             <a:picLocks noChangeAspect="1"/>
           </p:cNvPicPr>
           <p:nvPr/>
         </p:nvPicPr>
         <p:blipFill>
-          <a:blip r:embed="rId2"/>
+          <a:blip r:embed="rId2">
+            <a:extLst>
+              <a:ext uri="{28A0092B-C50C-407E-A947-70E740481C1C}">
+                <a14:useLocalDpi xmlns:a14="http://schemas.microsoft.com/office/drawing/2010/main" val="0"/>
+              </a:ext>
+            </a:extLst>
+          </a:blip>
           <a:stretch>
             <a:fillRect/>
           </a:stretch>
         </p:blipFill>
         <p:spPr>
           <a:xfrm>
-            <a:off x="1295401" y="1538680"/>
-            <a:ext cx="9720262" cy="5319320"/>
+            <a:off x="1173707" y="1537240"/>
+            <a:ext cx="9722893" cy="5320760"/>
           </a:xfrm>
           <a:prstGeom prst="rect">
             <a:avLst/>
@@ -11984,13 +12013,13 @@
   <p:clrMapOvr>
     <a:masterClrMapping/>
   </p:clrMapOvr>
-  <mc:AlternateContent xmlns:mc="http://schemas.openxmlformats.org/markup-compatibility/2006" xmlns:p159="http://schemas.microsoft.com/office/powerpoint/2015/09/main">
-    <mc:Choice Requires="p159">
+  <mc:AlternateContent xmlns:mc="http://schemas.openxmlformats.org/markup-compatibility/2006">
+    <mc:Choice xmlns:p159="http://schemas.microsoft.com/office/powerpoint/2015/09/main" xmlns="" Requires="p159">
       <p:transition xmlns:p14="http://schemas.microsoft.com/office/powerpoint/2010/main" spd="slow" p14:dur="2000">
         <p159:morph option="byObject"/>
       </p:transition>
     </mc:Choice>
-    <mc:Fallback xmlns="">
+    <mc:Fallback>
       <p:transition spd="slow">
         <p:fade/>
       </p:transition>
@@ -14522,13 +14551,13 @@
   <p:clrMapOvr>
     <a:masterClrMapping/>
   </p:clrMapOvr>
-  <mc:AlternateContent xmlns:mc="http://schemas.openxmlformats.org/markup-compatibility/2006" xmlns:p159="http://schemas.microsoft.com/office/powerpoint/2015/09/main">
-    <mc:Choice Requires="p159">
+  <mc:AlternateContent xmlns:mc="http://schemas.openxmlformats.org/markup-compatibility/2006">
+    <mc:Choice xmlns:p159="http://schemas.microsoft.com/office/powerpoint/2015/09/main" xmlns="" Requires="p159">
       <p:transition xmlns:p14="http://schemas.microsoft.com/office/powerpoint/2010/main" spd="slow" p14:dur="2000">
         <p159:morph option="byObject"/>
       </p:transition>
     </mc:Choice>
-    <mc:Fallback xmlns="">
+    <mc:Fallback>
       <p:transition spd="slow">
         <p:fade/>
       </p:transition>
@@ -15467,13 +15496,13 @@
   <p:clrMapOvr>
     <a:masterClrMapping/>
   </p:clrMapOvr>
-  <mc:AlternateContent xmlns:mc="http://schemas.openxmlformats.org/markup-compatibility/2006" xmlns:p159="http://schemas.microsoft.com/office/powerpoint/2015/09/main">
-    <mc:Choice Requires="p159">
+  <mc:AlternateContent xmlns:mc="http://schemas.openxmlformats.org/markup-compatibility/2006">
+    <mc:Choice xmlns:p159="http://schemas.microsoft.com/office/powerpoint/2015/09/main" xmlns="" Requires="p159">
       <p:transition xmlns:p14="http://schemas.microsoft.com/office/powerpoint/2010/main" spd="slow" p14:dur="1250">
         <p159:morph option="byObject"/>
       </p:transition>
     </mc:Choice>
-    <mc:Fallback xmlns="">
+    <mc:Fallback>
       <p:transition spd="slow">
         <p:fade/>
       </p:transition>

</xml_diff>